<commit_message>
ABCS2021 Conf FINISHED :D
</commit_message>
<xml_diff>
--- a/diagramNN.pptx
+++ b/diagramNN.pptx
@@ -6,6 +6,8 @@
   </p:sldMasterIdLst>
   <p:sldIdLst>
     <p:sldId id="256" r:id="rId2"/>
+    <p:sldId id="257" r:id="rId3"/>
+    <p:sldId id="258" r:id="rId4"/>
   </p:sldIdLst>
   <p:sldSz cx="12192000" cy="6858000"/>
   <p:notesSz cx="6858000" cy="9144000"/>
@@ -3420,7 +3422,7 @@
             </a:r>
             <a:r>
               <a:rPr lang="en-AU" altLang="zh-CN" sz="1200" dirty="0"/>
-              <a:t> = 10</a:t>
+              <a:t> = 4</a:t>
             </a:r>
             <a:endParaRPr lang="zh-CN" altLang="en-US" sz="1200" dirty="0"/>
           </a:p>
@@ -3514,7 +3516,7 @@
             </a:r>
             <a:r>
               <a:rPr lang="en-AU" altLang="zh-CN" sz="1200" dirty="0"/>
-              <a:t> = 10</a:t>
+              <a:t> = 23 or 12</a:t>
             </a:r>
           </a:p>
           <a:p>
@@ -3603,10 +3605,2775 @@
           </a:fontRef>
         </p:style>
       </p:cxnSp>
+      <p:sp>
+        <p:nvSpPr>
+          <p:cNvPr id="12" name="文本框 11">
+            <a:extLst>
+              <a:ext uri="{FF2B5EF4-FFF2-40B4-BE49-F238E27FC236}">
+                <a16:creationId xmlns:a16="http://schemas.microsoft.com/office/drawing/2014/main" id="{816F69BB-0AAE-4608-8127-7C0B0C75C68B}"/>
+              </a:ext>
+            </a:extLst>
+          </p:cNvPr>
+          <p:cNvSpPr txBox="1"/>
+          <p:nvPr/>
+        </p:nvSpPr>
+        <p:spPr>
+          <a:xfrm>
+            <a:off x="2483141" y="6065512"/>
+            <a:ext cx="1459685" cy="369332"/>
+          </a:xfrm>
+          <a:prstGeom prst="rect">
+            <a:avLst/>
+          </a:prstGeom>
+          <a:noFill/>
+        </p:spPr>
+        <p:txBody>
+          <a:bodyPr wrap="square" rtlCol="0">
+            <a:spAutoFit/>
+          </a:bodyPr>
+          <a:lstStyle/>
+          <a:p>
+            <a:r>
+              <a:rPr lang="en-AU" altLang="zh-CN" dirty="0"/>
+              <a:t>Initial FCN</a:t>
+            </a:r>
+            <a:endParaRPr lang="zh-CN" altLang="en-US" dirty="0"/>
+          </a:p>
+        </p:txBody>
+      </p:sp>
     </p:spTree>
     <p:extLst>
       <p:ext uri="{BB962C8B-B14F-4D97-AF65-F5344CB8AC3E}">
         <p14:creationId xmlns:p14="http://schemas.microsoft.com/office/powerpoint/2010/main" val="1654512947"/>
+      </p:ext>
+    </p:extLst>
+  </p:cSld>
+  <p:clrMapOvr>
+    <a:masterClrMapping/>
+  </p:clrMapOvr>
+</p:sld>
+</file>
+
+<file path=ppt/slides/slide2.xml><?xml version="1.0" encoding="utf-8"?>
+<p:sld xmlns:a="http://schemas.openxmlformats.org/drawingml/2006/main" xmlns:r="http://schemas.openxmlformats.org/officeDocument/2006/relationships" xmlns:p="http://schemas.openxmlformats.org/presentationml/2006/main">
+  <p:cSld>
+    <p:spTree>
+      <p:nvGrpSpPr>
+        <p:cNvPr id="1" name=""/>
+        <p:cNvGrpSpPr/>
+        <p:nvPr/>
+      </p:nvGrpSpPr>
+      <p:grpSpPr>
+        <a:xfrm>
+          <a:off x="0" y="0"/>
+          <a:ext cx="0" cy="0"/>
+          <a:chOff x="0" y="0"/>
+          <a:chExt cx="0" cy="0"/>
+        </a:xfrm>
+      </p:grpSpPr>
+      <p:sp>
+        <p:nvSpPr>
+          <p:cNvPr id="3" name="流程图: 接点 2">
+            <a:extLst>
+              <a:ext uri="{FF2B5EF4-FFF2-40B4-BE49-F238E27FC236}">
+                <a16:creationId xmlns:a16="http://schemas.microsoft.com/office/drawing/2014/main" id="{EDFAE48A-4CA0-4F1B-9366-6E71151A3ACD}"/>
+              </a:ext>
+            </a:extLst>
+          </p:cNvPr>
+          <p:cNvSpPr/>
+          <p:nvPr/>
+        </p:nvSpPr>
+        <p:spPr>
+          <a:xfrm>
+            <a:off x="1124125" y="1057013"/>
+            <a:ext cx="1182847" cy="1124125"/>
+          </a:xfrm>
+          <a:prstGeom prst="flowChartConnector">
+            <a:avLst/>
+          </a:prstGeom>
+          <a:solidFill>
+            <a:schemeClr val="accent2">
+              <a:alpha val="50000"/>
+            </a:schemeClr>
+          </a:solidFill>
+          <a:ln>
+            <a:noFill/>
+          </a:ln>
+        </p:spPr>
+        <p:style>
+          <a:lnRef idx="0">
+            <a:scrgbClr r="0" g="0" b="0"/>
+          </a:lnRef>
+          <a:fillRef idx="0">
+            <a:scrgbClr r="0" g="0" b="0"/>
+          </a:fillRef>
+          <a:effectRef idx="0">
+            <a:scrgbClr r="0" g="0" b="0"/>
+          </a:effectRef>
+          <a:fontRef idx="minor">
+            <a:schemeClr val="lt1"/>
+          </a:fontRef>
+        </p:style>
+        <p:txBody>
+          <a:bodyPr rtlCol="0" anchor="ctr"/>
+          <a:lstStyle/>
+          <a:p>
+            <a:pPr algn="ctr"/>
+            <a:endParaRPr lang="zh-CN" altLang="en-US"/>
+          </a:p>
+        </p:txBody>
+      </p:sp>
+      <p:sp>
+        <p:nvSpPr>
+          <p:cNvPr id="4" name="流程图: 接点 3">
+            <a:extLst>
+              <a:ext uri="{FF2B5EF4-FFF2-40B4-BE49-F238E27FC236}">
+                <a16:creationId xmlns:a16="http://schemas.microsoft.com/office/drawing/2014/main" id="{E6C829A1-E839-4550-BC47-72EE9F20F1CE}"/>
+              </a:ext>
+            </a:extLst>
+          </p:cNvPr>
+          <p:cNvSpPr/>
+          <p:nvPr/>
+        </p:nvSpPr>
+        <p:spPr>
+          <a:xfrm>
+            <a:off x="1124126" y="3952613"/>
+            <a:ext cx="1182846" cy="1124125"/>
+          </a:xfrm>
+          <a:prstGeom prst="flowChartConnector">
+            <a:avLst/>
+          </a:prstGeom>
+          <a:solidFill>
+            <a:schemeClr val="accent2">
+              <a:alpha val="50000"/>
+            </a:schemeClr>
+          </a:solidFill>
+          <a:ln>
+            <a:noFill/>
+          </a:ln>
+        </p:spPr>
+        <p:style>
+          <a:lnRef idx="0">
+            <a:scrgbClr r="0" g="0" b="0"/>
+          </a:lnRef>
+          <a:fillRef idx="0">
+            <a:scrgbClr r="0" g="0" b="0"/>
+          </a:fillRef>
+          <a:effectRef idx="0">
+            <a:scrgbClr r="0" g="0" b="0"/>
+          </a:effectRef>
+          <a:fontRef idx="minor">
+            <a:schemeClr val="lt1"/>
+          </a:fontRef>
+        </p:style>
+        <p:txBody>
+          <a:bodyPr rtlCol="0" anchor="ctr"/>
+          <a:lstStyle/>
+          <a:p>
+            <a:pPr algn="ctr"/>
+            <a:endParaRPr lang="zh-CN" altLang="en-US"/>
+          </a:p>
+        </p:txBody>
+      </p:sp>
+      <p:sp>
+        <p:nvSpPr>
+          <p:cNvPr id="5" name="文本框 4">
+            <a:extLst>
+              <a:ext uri="{FF2B5EF4-FFF2-40B4-BE49-F238E27FC236}">
+                <a16:creationId xmlns:a16="http://schemas.microsoft.com/office/drawing/2014/main" id="{F450CEBC-EFD3-4162-BB22-F5AF1CBD8211}"/>
+              </a:ext>
+            </a:extLst>
+          </p:cNvPr>
+          <p:cNvSpPr txBox="1"/>
+          <p:nvPr/>
+        </p:nvSpPr>
+        <p:spPr>
+          <a:xfrm>
+            <a:off x="1258348" y="1295909"/>
+            <a:ext cx="914400" cy="646331"/>
+          </a:xfrm>
+          <a:prstGeom prst="rect">
+            <a:avLst/>
+          </a:prstGeom>
+          <a:noFill/>
+        </p:spPr>
+        <p:txBody>
+          <a:bodyPr wrap="square" rtlCol="0">
+            <a:spAutoFit/>
+          </a:bodyPr>
+          <a:lstStyle/>
+          <a:p>
+            <a:pPr algn="ctr"/>
+            <a:r>
+              <a:rPr lang="en-AU" altLang="zh-CN" dirty="0"/>
+              <a:t>input</a:t>
+            </a:r>
+          </a:p>
+          <a:p>
+            <a:pPr algn="ctr"/>
+            <a:r>
+              <a:rPr lang="en-AU" altLang="zh-CN" dirty="0"/>
+              <a:t>neuron</a:t>
+            </a:r>
+            <a:endParaRPr lang="zh-CN" altLang="en-US" dirty="0"/>
+          </a:p>
+        </p:txBody>
+      </p:sp>
+      <p:sp>
+        <p:nvSpPr>
+          <p:cNvPr id="6" name="文本框 5">
+            <a:extLst>
+              <a:ext uri="{FF2B5EF4-FFF2-40B4-BE49-F238E27FC236}">
+                <a16:creationId xmlns:a16="http://schemas.microsoft.com/office/drawing/2014/main" id="{5D40219C-60FF-4176-A03C-D35C58506686}"/>
+              </a:ext>
+            </a:extLst>
+          </p:cNvPr>
+          <p:cNvSpPr txBox="1"/>
+          <p:nvPr/>
+        </p:nvSpPr>
+        <p:spPr>
+          <a:xfrm>
+            <a:off x="1258348" y="4191509"/>
+            <a:ext cx="914400" cy="646331"/>
+          </a:xfrm>
+          <a:prstGeom prst="rect">
+            <a:avLst/>
+          </a:prstGeom>
+          <a:noFill/>
+        </p:spPr>
+        <p:txBody>
+          <a:bodyPr wrap="square" rtlCol="0">
+            <a:spAutoFit/>
+          </a:bodyPr>
+          <a:lstStyle/>
+          <a:p>
+            <a:pPr algn="ctr"/>
+            <a:r>
+              <a:rPr lang="en-AU" altLang="zh-CN" dirty="0"/>
+              <a:t>output</a:t>
+            </a:r>
+          </a:p>
+          <a:p>
+            <a:pPr algn="ctr"/>
+            <a:r>
+              <a:rPr lang="en-AU" altLang="zh-CN" dirty="0"/>
+              <a:t>neuron</a:t>
+            </a:r>
+            <a:endParaRPr lang="zh-CN" altLang="en-US" dirty="0"/>
+          </a:p>
+        </p:txBody>
+      </p:sp>
+      <p:cxnSp>
+        <p:nvCxnSpPr>
+          <p:cNvPr id="8" name="直接连接符 7">
+            <a:extLst>
+              <a:ext uri="{FF2B5EF4-FFF2-40B4-BE49-F238E27FC236}">
+                <a16:creationId xmlns:a16="http://schemas.microsoft.com/office/drawing/2014/main" id="{1F951E92-DBE1-445C-8A95-AAA88B6A7297}"/>
+              </a:ext>
+            </a:extLst>
+          </p:cNvPr>
+          <p:cNvCxnSpPr>
+            <a:stCxn id="3" idx="4"/>
+            <a:endCxn id="4" idx="0"/>
+          </p:cNvCxnSpPr>
+          <p:nvPr/>
+        </p:nvCxnSpPr>
+        <p:spPr>
+          <a:xfrm>
+            <a:off x="1715549" y="2181138"/>
+            <a:ext cx="0" cy="1771475"/>
+          </a:xfrm>
+          <a:prstGeom prst="line">
+            <a:avLst/>
+          </a:prstGeom>
+          <a:ln w="57150">
+            <a:solidFill>
+              <a:srgbClr val="FF0000"/>
+            </a:solidFill>
+          </a:ln>
+        </p:spPr>
+        <p:style>
+          <a:lnRef idx="3">
+            <a:schemeClr val="accent2"/>
+          </a:lnRef>
+          <a:fillRef idx="0">
+            <a:schemeClr val="accent2"/>
+          </a:fillRef>
+          <a:effectRef idx="2">
+            <a:schemeClr val="accent2"/>
+          </a:effectRef>
+          <a:fontRef idx="minor">
+            <a:schemeClr val="tx1"/>
+          </a:fontRef>
+        </p:style>
+      </p:cxnSp>
+      <p:sp>
+        <p:nvSpPr>
+          <p:cNvPr id="9" name="文本框 8">
+            <a:extLst>
+              <a:ext uri="{FF2B5EF4-FFF2-40B4-BE49-F238E27FC236}">
+                <a16:creationId xmlns:a16="http://schemas.microsoft.com/office/drawing/2014/main" id="{34DA28DF-4CDD-4C0B-86F0-B0641F0E5CAC}"/>
+              </a:ext>
+            </a:extLst>
+          </p:cNvPr>
+          <p:cNvSpPr txBox="1"/>
+          <p:nvPr/>
+        </p:nvSpPr>
+        <p:spPr>
+          <a:xfrm>
+            <a:off x="906011" y="5301842"/>
+            <a:ext cx="1400961" cy="369332"/>
+          </a:xfrm>
+          <a:prstGeom prst="rect">
+            <a:avLst/>
+          </a:prstGeom>
+          <a:noFill/>
+        </p:spPr>
+        <p:txBody>
+          <a:bodyPr wrap="square" rtlCol="0">
+            <a:spAutoFit/>
+          </a:bodyPr>
+          <a:lstStyle/>
+          <a:p>
+            <a:pPr algn="ctr"/>
+            <a:r>
+              <a:rPr lang="en-AU" altLang="zh-CN" dirty="0"/>
+              <a:t>initial FCN</a:t>
+            </a:r>
+            <a:endParaRPr lang="zh-CN" altLang="en-US" dirty="0"/>
+          </a:p>
+        </p:txBody>
+      </p:sp>
+      <p:sp>
+        <p:nvSpPr>
+          <p:cNvPr id="10" name="流程图: 接点 9">
+            <a:extLst>
+              <a:ext uri="{FF2B5EF4-FFF2-40B4-BE49-F238E27FC236}">
+                <a16:creationId xmlns:a16="http://schemas.microsoft.com/office/drawing/2014/main" id="{69F4CC4E-A4F4-4046-9F4C-35BB02B21F22}"/>
+              </a:ext>
+            </a:extLst>
+          </p:cNvPr>
+          <p:cNvSpPr/>
+          <p:nvPr/>
+        </p:nvSpPr>
+        <p:spPr>
+          <a:xfrm>
+            <a:off x="3600275" y="1060991"/>
+            <a:ext cx="1182847" cy="1124125"/>
+          </a:xfrm>
+          <a:prstGeom prst="flowChartConnector">
+            <a:avLst/>
+          </a:prstGeom>
+          <a:solidFill>
+            <a:schemeClr val="accent2">
+              <a:alpha val="50000"/>
+            </a:schemeClr>
+          </a:solidFill>
+          <a:ln>
+            <a:noFill/>
+          </a:ln>
+        </p:spPr>
+        <p:style>
+          <a:lnRef idx="0">
+            <a:scrgbClr r="0" g="0" b="0"/>
+          </a:lnRef>
+          <a:fillRef idx="0">
+            <a:scrgbClr r="0" g="0" b="0"/>
+          </a:fillRef>
+          <a:effectRef idx="0">
+            <a:scrgbClr r="0" g="0" b="0"/>
+          </a:effectRef>
+          <a:fontRef idx="minor">
+            <a:schemeClr val="lt1"/>
+          </a:fontRef>
+        </p:style>
+        <p:txBody>
+          <a:bodyPr rtlCol="0" anchor="ctr"/>
+          <a:lstStyle/>
+          <a:p>
+            <a:pPr algn="ctr"/>
+            <a:endParaRPr lang="zh-CN" altLang="en-US"/>
+          </a:p>
+        </p:txBody>
+      </p:sp>
+      <p:sp>
+        <p:nvSpPr>
+          <p:cNvPr id="11" name="流程图: 接点 10">
+            <a:extLst>
+              <a:ext uri="{FF2B5EF4-FFF2-40B4-BE49-F238E27FC236}">
+                <a16:creationId xmlns:a16="http://schemas.microsoft.com/office/drawing/2014/main" id="{2E5655F4-771E-4C04-B89D-641B6D97B0F4}"/>
+              </a:ext>
+            </a:extLst>
+          </p:cNvPr>
+          <p:cNvSpPr/>
+          <p:nvPr/>
+        </p:nvSpPr>
+        <p:spPr>
+          <a:xfrm>
+            <a:off x="3600276" y="3956591"/>
+            <a:ext cx="1182846" cy="1124125"/>
+          </a:xfrm>
+          <a:prstGeom prst="flowChartConnector">
+            <a:avLst/>
+          </a:prstGeom>
+          <a:solidFill>
+            <a:schemeClr val="accent2">
+              <a:alpha val="50000"/>
+            </a:schemeClr>
+          </a:solidFill>
+          <a:ln>
+            <a:noFill/>
+          </a:ln>
+        </p:spPr>
+        <p:style>
+          <a:lnRef idx="0">
+            <a:scrgbClr r="0" g="0" b="0"/>
+          </a:lnRef>
+          <a:fillRef idx="0">
+            <a:scrgbClr r="0" g="0" b="0"/>
+          </a:fillRef>
+          <a:effectRef idx="0">
+            <a:scrgbClr r="0" g="0" b="0"/>
+          </a:effectRef>
+          <a:fontRef idx="minor">
+            <a:schemeClr val="lt1"/>
+          </a:fontRef>
+        </p:style>
+        <p:txBody>
+          <a:bodyPr rtlCol="0" anchor="ctr"/>
+          <a:lstStyle/>
+          <a:p>
+            <a:pPr algn="ctr"/>
+            <a:endParaRPr lang="zh-CN" altLang="en-US"/>
+          </a:p>
+        </p:txBody>
+      </p:sp>
+      <p:sp>
+        <p:nvSpPr>
+          <p:cNvPr id="12" name="文本框 11">
+            <a:extLst>
+              <a:ext uri="{FF2B5EF4-FFF2-40B4-BE49-F238E27FC236}">
+                <a16:creationId xmlns:a16="http://schemas.microsoft.com/office/drawing/2014/main" id="{17E0DA67-6D66-4DAD-A5FA-C02343190042}"/>
+              </a:ext>
+            </a:extLst>
+          </p:cNvPr>
+          <p:cNvSpPr txBox="1"/>
+          <p:nvPr/>
+        </p:nvSpPr>
+        <p:spPr>
+          <a:xfrm>
+            <a:off x="3734498" y="1299887"/>
+            <a:ext cx="914400" cy="646331"/>
+          </a:xfrm>
+          <a:prstGeom prst="rect">
+            <a:avLst/>
+          </a:prstGeom>
+          <a:noFill/>
+        </p:spPr>
+        <p:txBody>
+          <a:bodyPr wrap="square" rtlCol="0">
+            <a:spAutoFit/>
+          </a:bodyPr>
+          <a:lstStyle/>
+          <a:p>
+            <a:pPr algn="ctr"/>
+            <a:r>
+              <a:rPr lang="en-AU" altLang="zh-CN" dirty="0"/>
+              <a:t>input</a:t>
+            </a:r>
+          </a:p>
+          <a:p>
+            <a:pPr algn="ctr"/>
+            <a:r>
+              <a:rPr lang="en-AU" altLang="zh-CN" dirty="0"/>
+              <a:t>neuron</a:t>
+            </a:r>
+            <a:endParaRPr lang="zh-CN" altLang="en-US" dirty="0"/>
+          </a:p>
+        </p:txBody>
+      </p:sp>
+      <p:sp>
+        <p:nvSpPr>
+          <p:cNvPr id="13" name="文本框 12">
+            <a:extLst>
+              <a:ext uri="{FF2B5EF4-FFF2-40B4-BE49-F238E27FC236}">
+                <a16:creationId xmlns:a16="http://schemas.microsoft.com/office/drawing/2014/main" id="{6458804E-D133-4974-A7D9-A14FED878B8B}"/>
+              </a:ext>
+            </a:extLst>
+          </p:cNvPr>
+          <p:cNvSpPr txBox="1"/>
+          <p:nvPr/>
+        </p:nvSpPr>
+        <p:spPr>
+          <a:xfrm>
+            <a:off x="3734498" y="4195487"/>
+            <a:ext cx="914400" cy="646331"/>
+          </a:xfrm>
+          <a:prstGeom prst="rect">
+            <a:avLst/>
+          </a:prstGeom>
+          <a:noFill/>
+        </p:spPr>
+        <p:txBody>
+          <a:bodyPr wrap="square" rtlCol="0">
+            <a:spAutoFit/>
+          </a:bodyPr>
+          <a:lstStyle/>
+          <a:p>
+            <a:pPr algn="ctr"/>
+            <a:r>
+              <a:rPr lang="en-AU" altLang="zh-CN" dirty="0"/>
+              <a:t>output</a:t>
+            </a:r>
+          </a:p>
+          <a:p>
+            <a:pPr algn="ctr"/>
+            <a:r>
+              <a:rPr lang="en-AU" altLang="zh-CN" dirty="0"/>
+              <a:t>neuron</a:t>
+            </a:r>
+            <a:endParaRPr lang="zh-CN" altLang="en-US" dirty="0"/>
+          </a:p>
+        </p:txBody>
+      </p:sp>
+      <p:cxnSp>
+        <p:nvCxnSpPr>
+          <p:cNvPr id="14" name="直接连接符 13">
+            <a:extLst>
+              <a:ext uri="{FF2B5EF4-FFF2-40B4-BE49-F238E27FC236}">
+                <a16:creationId xmlns:a16="http://schemas.microsoft.com/office/drawing/2014/main" id="{79280204-24AC-4EE9-99D5-13E59FCAB304}"/>
+              </a:ext>
+            </a:extLst>
+          </p:cNvPr>
+          <p:cNvCxnSpPr>
+            <a:stCxn id="10" idx="4"/>
+            <a:endCxn id="11" idx="0"/>
+          </p:cNvCxnSpPr>
+          <p:nvPr/>
+        </p:nvCxnSpPr>
+        <p:spPr>
+          <a:xfrm>
+            <a:off x="4191699" y="2185116"/>
+            <a:ext cx="0" cy="1771475"/>
+          </a:xfrm>
+          <a:prstGeom prst="line">
+            <a:avLst/>
+          </a:prstGeom>
+          <a:ln w="57150">
+            <a:solidFill>
+              <a:srgbClr val="FF0000"/>
+            </a:solidFill>
+          </a:ln>
+        </p:spPr>
+        <p:style>
+          <a:lnRef idx="3">
+            <a:schemeClr val="dk1"/>
+          </a:lnRef>
+          <a:fillRef idx="0">
+            <a:schemeClr val="dk1"/>
+          </a:fillRef>
+          <a:effectRef idx="2">
+            <a:schemeClr val="dk1"/>
+          </a:effectRef>
+          <a:fontRef idx="minor">
+            <a:schemeClr val="tx1"/>
+          </a:fontRef>
+        </p:style>
+      </p:cxnSp>
+      <p:sp>
+        <p:nvSpPr>
+          <p:cNvPr id="15" name="文本框 14">
+            <a:extLst>
+              <a:ext uri="{FF2B5EF4-FFF2-40B4-BE49-F238E27FC236}">
+                <a16:creationId xmlns:a16="http://schemas.microsoft.com/office/drawing/2014/main" id="{34CA7B04-BA95-405C-888A-997E9DF070CC}"/>
+              </a:ext>
+            </a:extLst>
+          </p:cNvPr>
+          <p:cNvSpPr txBox="1"/>
+          <p:nvPr/>
+        </p:nvSpPr>
+        <p:spPr>
+          <a:xfrm>
+            <a:off x="2930932" y="5313227"/>
+            <a:ext cx="2521532" cy="369332"/>
+          </a:xfrm>
+          <a:prstGeom prst="rect">
+            <a:avLst/>
+          </a:prstGeom>
+          <a:noFill/>
+        </p:spPr>
+        <p:txBody>
+          <a:bodyPr wrap="square" rtlCol="0">
+            <a:spAutoFit/>
+          </a:bodyPr>
+          <a:lstStyle/>
+          <a:p>
+            <a:pPr algn="ctr"/>
+            <a:r>
+              <a:rPr lang="en-AU" altLang="zh-CN" dirty="0"/>
+              <a:t>one live hidden neuron</a:t>
+            </a:r>
+            <a:endParaRPr lang="zh-CN" altLang="en-US" dirty="0"/>
+          </a:p>
+        </p:txBody>
+      </p:sp>
+      <p:sp>
+        <p:nvSpPr>
+          <p:cNvPr id="17" name="流程图: 接点 16">
+            <a:extLst>
+              <a:ext uri="{FF2B5EF4-FFF2-40B4-BE49-F238E27FC236}">
+                <a16:creationId xmlns:a16="http://schemas.microsoft.com/office/drawing/2014/main" id="{7BD2AF4F-3843-447A-A7F9-9B8E4AF6921F}"/>
+              </a:ext>
+            </a:extLst>
+          </p:cNvPr>
+          <p:cNvSpPr/>
+          <p:nvPr/>
+        </p:nvSpPr>
+        <p:spPr>
+          <a:xfrm>
+            <a:off x="5240321" y="1942240"/>
+            <a:ext cx="1182847" cy="1124125"/>
+          </a:xfrm>
+          <a:prstGeom prst="flowChartConnector">
+            <a:avLst/>
+          </a:prstGeom>
+          <a:solidFill>
+            <a:srgbClr val="FF0000">
+              <a:alpha val="50000"/>
+            </a:srgbClr>
+          </a:solidFill>
+          <a:ln>
+            <a:noFill/>
+          </a:ln>
+        </p:spPr>
+        <p:style>
+          <a:lnRef idx="0">
+            <a:scrgbClr r="0" g="0" b="0"/>
+          </a:lnRef>
+          <a:fillRef idx="0">
+            <a:scrgbClr r="0" g="0" b="0"/>
+          </a:fillRef>
+          <a:effectRef idx="0">
+            <a:scrgbClr r="0" g="0" b="0"/>
+          </a:effectRef>
+          <a:fontRef idx="minor">
+            <a:schemeClr val="lt1"/>
+          </a:fontRef>
+        </p:style>
+        <p:txBody>
+          <a:bodyPr rtlCol="0" anchor="ctr"/>
+          <a:lstStyle/>
+          <a:p>
+            <a:pPr algn="ctr"/>
+            <a:endParaRPr lang="zh-CN" altLang="en-US"/>
+          </a:p>
+        </p:txBody>
+      </p:sp>
+      <p:sp>
+        <p:nvSpPr>
+          <p:cNvPr id="18" name="文本框 17">
+            <a:extLst>
+              <a:ext uri="{FF2B5EF4-FFF2-40B4-BE49-F238E27FC236}">
+                <a16:creationId xmlns:a16="http://schemas.microsoft.com/office/drawing/2014/main" id="{258D5570-DBD8-4DF3-9B4A-99F2F59E8FAD}"/>
+              </a:ext>
+            </a:extLst>
+          </p:cNvPr>
+          <p:cNvSpPr txBox="1"/>
+          <p:nvPr/>
+        </p:nvSpPr>
+        <p:spPr>
+          <a:xfrm>
+            <a:off x="5391321" y="2181136"/>
+            <a:ext cx="914400" cy="646331"/>
+          </a:xfrm>
+          <a:prstGeom prst="rect">
+            <a:avLst/>
+          </a:prstGeom>
+          <a:noFill/>
+        </p:spPr>
+        <p:txBody>
+          <a:bodyPr wrap="square" rtlCol="0">
+            <a:spAutoFit/>
+          </a:bodyPr>
+          <a:lstStyle/>
+          <a:p>
+            <a:pPr algn="ctr"/>
+            <a:r>
+              <a:rPr lang="en-AU" altLang="zh-CN" dirty="0"/>
+              <a:t>hidden</a:t>
+            </a:r>
+          </a:p>
+          <a:p>
+            <a:pPr algn="ctr"/>
+            <a:r>
+              <a:rPr lang="en-AU" altLang="zh-CN" dirty="0"/>
+              <a:t>neuron</a:t>
+            </a:r>
+            <a:endParaRPr lang="zh-CN" altLang="en-US" dirty="0"/>
+          </a:p>
+        </p:txBody>
+      </p:sp>
+      <p:cxnSp>
+        <p:nvCxnSpPr>
+          <p:cNvPr id="20" name="直接连接符 19">
+            <a:extLst>
+              <a:ext uri="{FF2B5EF4-FFF2-40B4-BE49-F238E27FC236}">
+                <a16:creationId xmlns:a16="http://schemas.microsoft.com/office/drawing/2014/main" id="{FACD7EFB-E7AD-420B-9038-E6C32694CDF3}"/>
+              </a:ext>
+            </a:extLst>
+          </p:cNvPr>
+          <p:cNvCxnSpPr/>
+          <p:nvPr/>
+        </p:nvCxnSpPr>
+        <p:spPr>
+          <a:xfrm>
+            <a:off x="4723002" y="1862356"/>
+            <a:ext cx="597714" cy="385894"/>
+          </a:xfrm>
+          <a:prstGeom prst="line">
+            <a:avLst/>
+          </a:prstGeom>
+          <a:ln w="57150">
+            <a:solidFill>
+              <a:schemeClr val="accent6"/>
+            </a:solidFill>
+          </a:ln>
+        </p:spPr>
+        <p:style>
+          <a:lnRef idx="3">
+            <a:schemeClr val="accent2"/>
+          </a:lnRef>
+          <a:fillRef idx="0">
+            <a:schemeClr val="accent2"/>
+          </a:fillRef>
+          <a:effectRef idx="2">
+            <a:schemeClr val="accent2"/>
+          </a:effectRef>
+          <a:fontRef idx="minor">
+            <a:schemeClr val="tx1"/>
+          </a:fontRef>
+        </p:style>
+      </p:cxnSp>
+      <p:cxnSp>
+        <p:nvCxnSpPr>
+          <p:cNvPr id="22" name="直接连接符 21">
+            <a:extLst>
+              <a:ext uri="{FF2B5EF4-FFF2-40B4-BE49-F238E27FC236}">
+                <a16:creationId xmlns:a16="http://schemas.microsoft.com/office/drawing/2014/main" id="{FE494C5D-F31D-46F3-858E-83616F93F676}"/>
+              </a:ext>
+            </a:extLst>
+          </p:cNvPr>
+          <p:cNvCxnSpPr>
+            <a:endCxn id="11" idx="7"/>
+          </p:cNvCxnSpPr>
+          <p:nvPr/>
+        </p:nvCxnSpPr>
+        <p:spPr>
+          <a:xfrm flipH="1">
+            <a:off x="4609898" y="2983981"/>
+            <a:ext cx="935225" cy="1137234"/>
+          </a:xfrm>
+          <a:prstGeom prst="line">
+            <a:avLst/>
+          </a:prstGeom>
+          <a:ln w="57150"/>
+        </p:spPr>
+        <p:style>
+          <a:lnRef idx="3">
+            <a:schemeClr val="dk1"/>
+          </a:lnRef>
+          <a:fillRef idx="0">
+            <a:schemeClr val="dk1"/>
+          </a:fillRef>
+          <a:effectRef idx="2">
+            <a:schemeClr val="dk1"/>
+          </a:effectRef>
+          <a:fontRef idx="minor">
+            <a:schemeClr val="tx1"/>
+          </a:fontRef>
+        </p:style>
+      </p:cxnSp>
+      <p:sp>
+        <p:nvSpPr>
+          <p:cNvPr id="23" name="流程图: 接点 22">
+            <a:extLst>
+              <a:ext uri="{FF2B5EF4-FFF2-40B4-BE49-F238E27FC236}">
+                <a16:creationId xmlns:a16="http://schemas.microsoft.com/office/drawing/2014/main" id="{36D77792-B34C-4C2C-8811-54A6ECB64509}"/>
+              </a:ext>
+            </a:extLst>
+          </p:cNvPr>
+          <p:cNvSpPr/>
+          <p:nvPr/>
+        </p:nvSpPr>
+        <p:spPr>
+          <a:xfrm>
+            <a:off x="7715856" y="1124125"/>
+            <a:ext cx="1182847" cy="1124125"/>
+          </a:xfrm>
+          <a:prstGeom prst="flowChartConnector">
+            <a:avLst/>
+          </a:prstGeom>
+          <a:solidFill>
+            <a:schemeClr val="accent2">
+              <a:alpha val="50000"/>
+            </a:schemeClr>
+          </a:solidFill>
+          <a:ln>
+            <a:noFill/>
+          </a:ln>
+        </p:spPr>
+        <p:style>
+          <a:lnRef idx="0">
+            <a:scrgbClr r="0" g="0" b="0"/>
+          </a:lnRef>
+          <a:fillRef idx="0">
+            <a:scrgbClr r="0" g="0" b="0"/>
+          </a:fillRef>
+          <a:effectRef idx="0">
+            <a:scrgbClr r="0" g="0" b="0"/>
+          </a:effectRef>
+          <a:fontRef idx="minor">
+            <a:schemeClr val="lt1"/>
+          </a:fontRef>
+        </p:style>
+        <p:txBody>
+          <a:bodyPr rtlCol="0" anchor="ctr"/>
+          <a:lstStyle/>
+          <a:p>
+            <a:pPr algn="ctr"/>
+            <a:endParaRPr lang="zh-CN" altLang="en-US"/>
+          </a:p>
+        </p:txBody>
+      </p:sp>
+      <p:sp>
+        <p:nvSpPr>
+          <p:cNvPr id="24" name="流程图: 接点 23">
+            <a:extLst>
+              <a:ext uri="{FF2B5EF4-FFF2-40B4-BE49-F238E27FC236}">
+                <a16:creationId xmlns:a16="http://schemas.microsoft.com/office/drawing/2014/main" id="{0BAA31D2-0F91-4CC4-9921-5A4C9A8E51AE}"/>
+              </a:ext>
+            </a:extLst>
+          </p:cNvPr>
+          <p:cNvSpPr/>
+          <p:nvPr/>
+        </p:nvSpPr>
+        <p:spPr>
+          <a:xfrm>
+            <a:off x="7715857" y="4019725"/>
+            <a:ext cx="1182846" cy="1124125"/>
+          </a:xfrm>
+          <a:prstGeom prst="flowChartConnector">
+            <a:avLst/>
+          </a:prstGeom>
+          <a:solidFill>
+            <a:schemeClr val="accent2">
+              <a:alpha val="50000"/>
+            </a:schemeClr>
+          </a:solidFill>
+          <a:ln>
+            <a:noFill/>
+          </a:ln>
+        </p:spPr>
+        <p:style>
+          <a:lnRef idx="0">
+            <a:scrgbClr r="0" g="0" b="0"/>
+          </a:lnRef>
+          <a:fillRef idx="0">
+            <a:scrgbClr r="0" g="0" b="0"/>
+          </a:fillRef>
+          <a:effectRef idx="0">
+            <a:scrgbClr r="0" g="0" b="0"/>
+          </a:effectRef>
+          <a:fontRef idx="minor">
+            <a:schemeClr val="lt1"/>
+          </a:fontRef>
+        </p:style>
+        <p:txBody>
+          <a:bodyPr rtlCol="0" anchor="ctr"/>
+          <a:lstStyle/>
+          <a:p>
+            <a:pPr algn="ctr"/>
+            <a:endParaRPr lang="zh-CN" altLang="en-US"/>
+          </a:p>
+        </p:txBody>
+      </p:sp>
+      <p:sp>
+        <p:nvSpPr>
+          <p:cNvPr id="25" name="文本框 24">
+            <a:extLst>
+              <a:ext uri="{FF2B5EF4-FFF2-40B4-BE49-F238E27FC236}">
+                <a16:creationId xmlns:a16="http://schemas.microsoft.com/office/drawing/2014/main" id="{109DEE00-859D-495D-BCAD-F960E9C82471}"/>
+              </a:ext>
+            </a:extLst>
+          </p:cNvPr>
+          <p:cNvSpPr txBox="1"/>
+          <p:nvPr/>
+        </p:nvSpPr>
+        <p:spPr>
+          <a:xfrm>
+            <a:off x="7850079" y="1363021"/>
+            <a:ext cx="914400" cy="646331"/>
+          </a:xfrm>
+          <a:prstGeom prst="rect">
+            <a:avLst/>
+          </a:prstGeom>
+          <a:noFill/>
+        </p:spPr>
+        <p:txBody>
+          <a:bodyPr wrap="square" rtlCol="0">
+            <a:spAutoFit/>
+          </a:bodyPr>
+          <a:lstStyle/>
+          <a:p>
+            <a:pPr algn="ctr"/>
+            <a:r>
+              <a:rPr lang="en-AU" altLang="zh-CN"/>
+              <a:t>i</a:t>
+            </a:r>
+            <a:r>
+              <a:rPr lang="en-AU" altLang="zh-CN" dirty="0"/>
+              <a:t>nput</a:t>
+            </a:r>
+          </a:p>
+          <a:p>
+            <a:pPr algn="ctr"/>
+            <a:r>
+              <a:rPr lang="en-AU" altLang="zh-CN"/>
+              <a:t>neuro</a:t>
+            </a:r>
+            <a:r>
+              <a:rPr lang="en-AU" altLang="zh-CN" dirty="0"/>
+              <a:t>n</a:t>
+            </a:r>
+            <a:endParaRPr lang="zh-CN" altLang="en-US" dirty="0"/>
+          </a:p>
+        </p:txBody>
+      </p:sp>
+      <p:sp>
+        <p:nvSpPr>
+          <p:cNvPr id="26" name="文本框 25">
+            <a:extLst>
+              <a:ext uri="{FF2B5EF4-FFF2-40B4-BE49-F238E27FC236}">
+                <a16:creationId xmlns:a16="http://schemas.microsoft.com/office/drawing/2014/main" id="{1ABD55EA-0A8B-4B26-BBED-A5ECF5B73E06}"/>
+              </a:ext>
+            </a:extLst>
+          </p:cNvPr>
+          <p:cNvSpPr txBox="1"/>
+          <p:nvPr/>
+        </p:nvSpPr>
+        <p:spPr>
+          <a:xfrm>
+            <a:off x="7850079" y="4258621"/>
+            <a:ext cx="914400" cy="646331"/>
+          </a:xfrm>
+          <a:prstGeom prst="rect">
+            <a:avLst/>
+          </a:prstGeom>
+          <a:noFill/>
+        </p:spPr>
+        <p:txBody>
+          <a:bodyPr wrap="square" rtlCol="0">
+            <a:spAutoFit/>
+          </a:bodyPr>
+          <a:lstStyle/>
+          <a:p>
+            <a:pPr algn="ctr"/>
+            <a:r>
+              <a:rPr lang="en-AU" altLang="zh-CN" dirty="0"/>
+              <a:t>output</a:t>
+            </a:r>
+          </a:p>
+          <a:p>
+            <a:pPr algn="ctr"/>
+            <a:r>
+              <a:rPr lang="en-AU" altLang="zh-CN"/>
+              <a:t>neuro</a:t>
+            </a:r>
+            <a:r>
+              <a:rPr lang="en-AU" altLang="zh-CN" dirty="0"/>
+              <a:t>n</a:t>
+            </a:r>
+            <a:endParaRPr lang="zh-CN" altLang="en-US" dirty="0"/>
+          </a:p>
+        </p:txBody>
+      </p:sp>
+      <p:cxnSp>
+        <p:nvCxnSpPr>
+          <p:cNvPr id="27" name="直接连接符 26">
+            <a:extLst>
+              <a:ext uri="{FF2B5EF4-FFF2-40B4-BE49-F238E27FC236}">
+                <a16:creationId xmlns:a16="http://schemas.microsoft.com/office/drawing/2014/main" id="{22F6FB01-B63E-47FB-AFC2-7D4815223882}"/>
+              </a:ext>
+            </a:extLst>
+          </p:cNvPr>
+          <p:cNvCxnSpPr>
+            <a:stCxn id="23" idx="4"/>
+            <a:endCxn id="24" idx="0"/>
+          </p:cNvCxnSpPr>
+          <p:nvPr/>
+        </p:nvCxnSpPr>
+        <p:spPr>
+          <a:xfrm>
+            <a:off x="8307280" y="2248250"/>
+            <a:ext cx="0" cy="1771475"/>
+          </a:xfrm>
+          <a:prstGeom prst="line">
+            <a:avLst/>
+          </a:prstGeom>
+          <a:ln w="57150">
+            <a:solidFill>
+              <a:srgbClr val="FF0000"/>
+            </a:solidFill>
+          </a:ln>
+        </p:spPr>
+        <p:style>
+          <a:lnRef idx="3">
+            <a:schemeClr val="dk1"/>
+          </a:lnRef>
+          <a:fillRef idx="0">
+            <a:schemeClr val="dk1"/>
+          </a:fillRef>
+          <a:effectRef idx="2">
+            <a:schemeClr val="dk1"/>
+          </a:effectRef>
+          <a:fontRef idx="minor">
+            <a:schemeClr val="tx1"/>
+          </a:fontRef>
+        </p:style>
+      </p:cxnSp>
+      <p:sp>
+        <p:nvSpPr>
+          <p:cNvPr id="28" name="文本框 27">
+            <a:extLst>
+              <a:ext uri="{FF2B5EF4-FFF2-40B4-BE49-F238E27FC236}">
+                <a16:creationId xmlns:a16="http://schemas.microsoft.com/office/drawing/2014/main" id="{9581DA81-289F-4B2D-B812-ED522833D476}"/>
+              </a:ext>
+            </a:extLst>
+          </p:cNvPr>
+          <p:cNvSpPr txBox="1"/>
+          <p:nvPr/>
+        </p:nvSpPr>
+        <p:spPr>
+          <a:xfrm>
+            <a:off x="6832197" y="5313227"/>
+            <a:ext cx="2828507" cy="369332"/>
+          </a:xfrm>
+          <a:prstGeom prst="rect">
+            <a:avLst/>
+          </a:prstGeom>
+          <a:noFill/>
+        </p:spPr>
+        <p:txBody>
+          <a:bodyPr wrap="square" rtlCol="0">
+            <a:spAutoFit/>
+          </a:bodyPr>
+          <a:lstStyle/>
+          <a:p>
+            <a:pPr algn="ctr"/>
+            <a:r>
+              <a:rPr lang="en-AU" altLang="zh-CN" dirty="0"/>
+              <a:t>one frozen hidden neuron</a:t>
+            </a:r>
+            <a:endParaRPr lang="zh-CN" altLang="en-US" dirty="0"/>
+          </a:p>
+        </p:txBody>
+      </p:sp>
+      <p:sp>
+        <p:nvSpPr>
+          <p:cNvPr id="29" name="流程图: 接点 28">
+            <a:extLst>
+              <a:ext uri="{FF2B5EF4-FFF2-40B4-BE49-F238E27FC236}">
+                <a16:creationId xmlns:a16="http://schemas.microsoft.com/office/drawing/2014/main" id="{A534ED16-FA86-4E13-B6C4-B758203C825C}"/>
+              </a:ext>
+            </a:extLst>
+          </p:cNvPr>
+          <p:cNvSpPr/>
+          <p:nvPr/>
+        </p:nvSpPr>
+        <p:spPr>
+          <a:xfrm>
+            <a:off x="9355902" y="2005374"/>
+            <a:ext cx="1182847" cy="1124125"/>
+          </a:xfrm>
+          <a:prstGeom prst="flowChartConnector">
+            <a:avLst/>
+          </a:prstGeom>
+          <a:solidFill>
+            <a:schemeClr val="accent1">
+              <a:lumMod val="40000"/>
+              <a:lumOff val="60000"/>
+              <a:alpha val="50000"/>
+            </a:schemeClr>
+          </a:solidFill>
+          <a:ln>
+            <a:noFill/>
+          </a:ln>
+        </p:spPr>
+        <p:style>
+          <a:lnRef idx="0">
+            <a:scrgbClr r="0" g="0" b="0"/>
+          </a:lnRef>
+          <a:fillRef idx="0">
+            <a:scrgbClr r="0" g="0" b="0"/>
+          </a:fillRef>
+          <a:effectRef idx="0">
+            <a:scrgbClr r="0" g="0" b="0"/>
+          </a:effectRef>
+          <a:fontRef idx="minor">
+            <a:schemeClr val="lt1"/>
+          </a:fontRef>
+        </p:style>
+        <p:txBody>
+          <a:bodyPr rtlCol="0" anchor="ctr"/>
+          <a:lstStyle/>
+          <a:p>
+            <a:pPr algn="ctr"/>
+            <a:endParaRPr lang="zh-CN" altLang="en-US"/>
+          </a:p>
+        </p:txBody>
+      </p:sp>
+      <p:sp>
+        <p:nvSpPr>
+          <p:cNvPr id="30" name="文本框 29">
+            <a:extLst>
+              <a:ext uri="{FF2B5EF4-FFF2-40B4-BE49-F238E27FC236}">
+                <a16:creationId xmlns:a16="http://schemas.microsoft.com/office/drawing/2014/main" id="{16853D65-94BD-4A96-8D8A-6309995A45B4}"/>
+              </a:ext>
+            </a:extLst>
+          </p:cNvPr>
+          <p:cNvSpPr txBox="1"/>
+          <p:nvPr/>
+        </p:nvSpPr>
+        <p:spPr>
+          <a:xfrm>
+            <a:off x="9506902" y="2244270"/>
+            <a:ext cx="914400" cy="646331"/>
+          </a:xfrm>
+          <a:prstGeom prst="rect">
+            <a:avLst/>
+          </a:prstGeom>
+          <a:noFill/>
+        </p:spPr>
+        <p:txBody>
+          <a:bodyPr wrap="square" rtlCol="0">
+            <a:spAutoFit/>
+          </a:bodyPr>
+          <a:lstStyle/>
+          <a:p>
+            <a:pPr algn="ctr"/>
+            <a:r>
+              <a:rPr lang="en-AU" altLang="zh-CN"/>
+              <a:t>hidden</a:t>
+            </a:r>
+            <a:endParaRPr lang="en-AU" altLang="zh-CN" dirty="0"/>
+          </a:p>
+          <a:p>
+            <a:pPr algn="ctr"/>
+            <a:r>
+              <a:rPr lang="en-AU" altLang="zh-CN"/>
+              <a:t>neuro</a:t>
+            </a:r>
+            <a:r>
+              <a:rPr lang="en-AU" altLang="zh-CN" dirty="0"/>
+              <a:t>n</a:t>
+            </a:r>
+            <a:endParaRPr lang="zh-CN" altLang="en-US" dirty="0"/>
+          </a:p>
+        </p:txBody>
+      </p:sp>
+      <p:cxnSp>
+        <p:nvCxnSpPr>
+          <p:cNvPr id="31" name="直接连接符 30">
+            <a:extLst>
+              <a:ext uri="{FF2B5EF4-FFF2-40B4-BE49-F238E27FC236}">
+                <a16:creationId xmlns:a16="http://schemas.microsoft.com/office/drawing/2014/main" id="{E85D7FBC-E037-4797-B269-EC215A3B3FE0}"/>
+              </a:ext>
+            </a:extLst>
+          </p:cNvPr>
+          <p:cNvCxnSpPr/>
+          <p:nvPr/>
+        </p:nvCxnSpPr>
+        <p:spPr>
+          <a:xfrm>
+            <a:off x="8838583" y="1925490"/>
+            <a:ext cx="597714" cy="385894"/>
+          </a:xfrm>
+          <a:prstGeom prst="line">
+            <a:avLst/>
+          </a:prstGeom>
+          <a:ln w="57150">
+            <a:solidFill>
+              <a:schemeClr val="accent5">
+                <a:lumMod val="40000"/>
+                <a:lumOff val="60000"/>
+              </a:schemeClr>
+            </a:solidFill>
+          </a:ln>
+        </p:spPr>
+        <p:style>
+          <a:lnRef idx="3">
+            <a:schemeClr val="accent2"/>
+          </a:lnRef>
+          <a:fillRef idx="0">
+            <a:schemeClr val="accent2"/>
+          </a:fillRef>
+          <a:effectRef idx="2">
+            <a:schemeClr val="accent2"/>
+          </a:effectRef>
+          <a:fontRef idx="minor">
+            <a:schemeClr val="tx1"/>
+          </a:fontRef>
+        </p:style>
+      </p:cxnSp>
+      <p:cxnSp>
+        <p:nvCxnSpPr>
+          <p:cNvPr id="32" name="直接连接符 31">
+            <a:extLst>
+              <a:ext uri="{FF2B5EF4-FFF2-40B4-BE49-F238E27FC236}">
+                <a16:creationId xmlns:a16="http://schemas.microsoft.com/office/drawing/2014/main" id="{9B03875A-8C9F-4561-9A3A-AF61F7FF3CD1}"/>
+              </a:ext>
+            </a:extLst>
+          </p:cNvPr>
+          <p:cNvCxnSpPr>
+            <a:endCxn id="24" idx="7"/>
+          </p:cNvCxnSpPr>
+          <p:nvPr/>
+        </p:nvCxnSpPr>
+        <p:spPr>
+          <a:xfrm flipH="1">
+            <a:off x="8725479" y="3047115"/>
+            <a:ext cx="935225" cy="1137234"/>
+          </a:xfrm>
+          <a:prstGeom prst="line">
+            <a:avLst/>
+          </a:prstGeom>
+          <a:ln w="57150">
+            <a:solidFill>
+              <a:srgbClr val="FF0000"/>
+            </a:solidFill>
+          </a:ln>
+        </p:spPr>
+        <p:style>
+          <a:lnRef idx="3">
+            <a:schemeClr val="dk1"/>
+          </a:lnRef>
+          <a:fillRef idx="0">
+            <a:schemeClr val="dk1"/>
+          </a:fillRef>
+          <a:effectRef idx="2">
+            <a:schemeClr val="dk1"/>
+          </a:effectRef>
+          <a:fontRef idx="minor">
+            <a:schemeClr val="tx1"/>
+          </a:fontRef>
+        </p:style>
+      </p:cxnSp>
+      <p:sp>
+        <p:nvSpPr>
+          <p:cNvPr id="33" name="文本框 32">
+            <a:extLst>
+              <a:ext uri="{FF2B5EF4-FFF2-40B4-BE49-F238E27FC236}">
+                <a16:creationId xmlns:a16="http://schemas.microsoft.com/office/drawing/2014/main" id="{78ACD015-B409-447A-8797-B9571CAA7A80}"/>
+              </a:ext>
+            </a:extLst>
+          </p:cNvPr>
+          <p:cNvSpPr txBox="1"/>
+          <p:nvPr/>
+        </p:nvSpPr>
+        <p:spPr>
+          <a:xfrm>
+            <a:off x="2457186" y="6033830"/>
+            <a:ext cx="6175873" cy="646331"/>
+          </a:xfrm>
+          <a:prstGeom prst="rect">
+            <a:avLst/>
+          </a:prstGeom>
+          <a:noFill/>
+        </p:spPr>
+        <p:txBody>
+          <a:bodyPr wrap="square" rtlCol="0">
+            <a:spAutoFit/>
+          </a:bodyPr>
+          <a:lstStyle/>
+          <a:p>
+            <a:r>
+              <a:rPr lang="en-AU" altLang="zh-CN" b="1" dirty="0"/>
+              <a:t>Fig.1.The process to add a hidden neuron / layer into the network</a:t>
+            </a:r>
+            <a:endParaRPr lang="zh-CN" altLang="en-US" b="1" dirty="0"/>
+          </a:p>
+        </p:txBody>
+      </p:sp>
+    </p:spTree>
+    <p:extLst>
+      <p:ext uri="{BB962C8B-B14F-4D97-AF65-F5344CB8AC3E}">
+        <p14:creationId xmlns:p14="http://schemas.microsoft.com/office/powerpoint/2010/main" val="127871088"/>
+      </p:ext>
+    </p:extLst>
+  </p:cSld>
+  <p:clrMapOvr>
+    <a:masterClrMapping/>
+  </p:clrMapOvr>
+</p:sld>
+</file>
+
+<file path=ppt/slides/slide3.xml><?xml version="1.0" encoding="utf-8"?>
+<p:sld xmlns:a="http://schemas.openxmlformats.org/drawingml/2006/main" xmlns:r="http://schemas.openxmlformats.org/officeDocument/2006/relationships" xmlns:p="http://schemas.openxmlformats.org/presentationml/2006/main">
+  <p:cSld>
+    <p:spTree>
+      <p:nvGrpSpPr>
+        <p:cNvPr id="1" name=""/>
+        <p:cNvGrpSpPr/>
+        <p:nvPr/>
+      </p:nvGrpSpPr>
+      <p:grpSpPr>
+        <a:xfrm>
+          <a:off x="0" y="0"/>
+          <a:ext cx="0" cy="0"/>
+          <a:chOff x="0" y="0"/>
+          <a:chExt cx="0" cy="0"/>
+        </a:xfrm>
+      </p:grpSpPr>
+      <p:sp>
+        <p:nvSpPr>
+          <p:cNvPr id="2" name="流程图: 接点 1">
+            <a:extLst>
+              <a:ext uri="{FF2B5EF4-FFF2-40B4-BE49-F238E27FC236}">
+                <a16:creationId xmlns:a16="http://schemas.microsoft.com/office/drawing/2014/main" id="{7C66AE75-6C99-43D9-A27B-72395CC9268E}"/>
+              </a:ext>
+            </a:extLst>
+          </p:cNvPr>
+          <p:cNvSpPr/>
+          <p:nvPr/>
+        </p:nvSpPr>
+        <p:spPr>
+          <a:xfrm>
+            <a:off x="988484" y="200394"/>
+            <a:ext cx="1182847" cy="1124125"/>
+          </a:xfrm>
+          <a:prstGeom prst="flowChartConnector">
+            <a:avLst/>
+          </a:prstGeom>
+          <a:solidFill>
+            <a:schemeClr val="accent2">
+              <a:alpha val="50000"/>
+            </a:schemeClr>
+          </a:solidFill>
+          <a:ln>
+            <a:noFill/>
+          </a:ln>
+        </p:spPr>
+        <p:style>
+          <a:lnRef idx="0">
+            <a:scrgbClr r="0" g="0" b="0"/>
+          </a:lnRef>
+          <a:fillRef idx="0">
+            <a:scrgbClr r="0" g="0" b="0"/>
+          </a:fillRef>
+          <a:effectRef idx="0">
+            <a:scrgbClr r="0" g="0" b="0"/>
+          </a:effectRef>
+          <a:fontRef idx="minor">
+            <a:schemeClr val="lt1"/>
+          </a:fontRef>
+        </p:style>
+        <p:txBody>
+          <a:bodyPr rtlCol="0" anchor="ctr"/>
+          <a:lstStyle/>
+          <a:p>
+            <a:pPr algn="ctr"/>
+            <a:endParaRPr lang="zh-CN" altLang="en-US"/>
+          </a:p>
+        </p:txBody>
+      </p:sp>
+      <p:sp>
+        <p:nvSpPr>
+          <p:cNvPr id="3" name="流程图: 接点 2">
+            <a:extLst>
+              <a:ext uri="{FF2B5EF4-FFF2-40B4-BE49-F238E27FC236}">
+                <a16:creationId xmlns:a16="http://schemas.microsoft.com/office/drawing/2014/main" id="{6BB89A45-2BA6-4599-8D45-285BEAEB1160}"/>
+              </a:ext>
+            </a:extLst>
+          </p:cNvPr>
+          <p:cNvSpPr/>
+          <p:nvPr/>
+        </p:nvSpPr>
+        <p:spPr>
+          <a:xfrm>
+            <a:off x="1049313" y="4510373"/>
+            <a:ext cx="1182846" cy="1124125"/>
+          </a:xfrm>
+          <a:prstGeom prst="flowChartConnector">
+            <a:avLst/>
+          </a:prstGeom>
+          <a:solidFill>
+            <a:schemeClr val="accent2">
+              <a:alpha val="50000"/>
+            </a:schemeClr>
+          </a:solidFill>
+          <a:ln>
+            <a:noFill/>
+          </a:ln>
+        </p:spPr>
+        <p:style>
+          <a:lnRef idx="0">
+            <a:scrgbClr r="0" g="0" b="0"/>
+          </a:lnRef>
+          <a:fillRef idx="0">
+            <a:scrgbClr r="0" g="0" b="0"/>
+          </a:fillRef>
+          <a:effectRef idx="0">
+            <a:scrgbClr r="0" g="0" b="0"/>
+          </a:effectRef>
+          <a:fontRef idx="minor">
+            <a:schemeClr val="lt1"/>
+          </a:fontRef>
+        </p:style>
+        <p:txBody>
+          <a:bodyPr rtlCol="0" anchor="ctr"/>
+          <a:lstStyle/>
+          <a:p>
+            <a:pPr algn="ctr"/>
+            <a:endParaRPr lang="zh-CN" altLang="en-US"/>
+          </a:p>
+        </p:txBody>
+      </p:sp>
+      <p:sp>
+        <p:nvSpPr>
+          <p:cNvPr id="4" name="文本框 3">
+            <a:extLst>
+              <a:ext uri="{FF2B5EF4-FFF2-40B4-BE49-F238E27FC236}">
+                <a16:creationId xmlns:a16="http://schemas.microsoft.com/office/drawing/2014/main" id="{A6B00779-AC28-42D5-B7FB-888922D4D4EC}"/>
+              </a:ext>
+            </a:extLst>
+          </p:cNvPr>
+          <p:cNvSpPr txBox="1"/>
+          <p:nvPr/>
+        </p:nvSpPr>
+        <p:spPr>
+          <a:xfrm>
+            <a:off x="1122707" y="439290"/>
+            <a:ext cx="914400" cy="646331"/>
+          </a:xfrm>
+          <a:prstGeom prst="rect">
+            <a:avLst/>
+          </a:prstGeom>
+          <a:noFill/>
+        </p:spPr>
+        <p:txBody>
+          <a:bodyPr wrap="square" rtlCol="0">
+            <a:spAutoFit/>
+          </a:bodyPr>
+          <a:lstStyle/>
+          <a:p>
+            <a:pPr algn="ctr"/>
+            <a:r>
+              <a:rPr lang="en-AU" altLang="zh-CN"/>
+              <a:t>i</a:t>
+            </a:r>
+            <a:r>
+              <a:rPr lang="en-AU" altLang="zh-CN" dirty="0"/>
+              <a:t>nput</a:t>
+            </a:r>
+          </a:p>
+          <a:p>
+            <a:pPr algn="ctr"/>
+            <a:r>
+              <a:rPr lang="en-AU" altLang="zh-CN"/>
+              <a:t>neuro</a:t>
+            </a:r>
+            <a:r>
+              <a:rPr lang="en-AU" altLang="zh-CN" dirty="0"/>
+              <a:t>n</a:t>
+            </a:r>
+            <a:endParaRPr lang="zh-CN" altLang="en-US" dirty="0"/>
+          </a:p>
+        </p:txBody>
+      </p:sp>
+      <p:sp>
+        <p:nvSpPr>
+          <p:cNvPr id="5" name="文本框 4">
+            <a:extLst>
+              <a:ext uri="{FF2B5EF4-FFF2-40B4-BE49-F238E27FC236}">
+                <a16:creationId xmlns:a16="http://schemas.microsoft.com/office/drawing/2014/main" id="{D35A20DD-DC33-48E6-8B17-8B3A05777E86}"/>
+              </a:ext>
+            </a:extLst>
+          </p:cNvPr>
+          <p:cNvSpPr txBox="1"/>
+          <p:nvPr/>
+        </p:nvSpPr>
+        <p:spPr>
+          <a:xfrm>
+            <a:off x="1183535" y="4749269"/>
+            <a:ext cx="914400" cy="646331"/>
+          </a:xfrm>
+          <a:prstGeom prst="rect">
+            <a:avLst/>
+          </a:prstGeom>
+          <a:noFill/>
+        </p:spPr>
+        <p:txBody>
+          <a:bodyPr wrap="square" rtlCol="0">
+            <a:spAutoFit/>
+          </a:bodyPr>
+          <a:lstStyle/>
+          <a:p>
+            <a:pPr algn="ctr"/>
+            <a:r>
+              <a:rPr lang="en-AU" altLang="zh-CN" dirty="0"/>
+              <a:t>output</a:t>
+            </a:r>
+          </a:p>
+          <a:p>
+            <a:pPr algn="ctr"/>
+            <a:r>
+              <a:rPr lang="en-AU" altLang="zh-CN" dirty="0"/>
+              <a:t>neuron</a:t>
+            </a:r>
+            <a:endParaRPr lang="zh-CN" altLang="en-US" dirty="0"/>
+          </a:p>
+        </p:txBody>
+      </p:sp>
+      <p:cxnSp>
+        <p:nvCxnSpPr>
+          <p:cNvPr id="6" name="直接连接符 5">
+            <a:extLst>
+              <a:ext uri="{FF2B5EF4-FFF2-40B4-BE49-F238E27FC236}">
+                <a16:creationId xmlns:a16="http://schemas.microsoft.com/office/drawing/2014/main" id="{74A0D401-B350-429D-96DB-DFC5DBC0C2FB}"/>
+              </a:ext>
+            </a:extLst>
+          </p:cNvPr>
+          <p:cNvCxnSpPr>
+            <a:stCxn id="2" idx="4"/>
+            <a:endCxn id="3" idx="0"/>
+          </p:cNvCxnSpPr>
+          <p:nvPr/>
+        </p:nvCxnSpPr>
+        <p:spPr>
+          <a:xfrm>
+            <a:off x="1579908" y="1324519"/>
+            <a:ext cx="60828" cy="3185854"/>
+          </a:xfrm>
+          <a:prstGeom prst="line">
+            <a:avLst/>
+          </a:prstGeom>
+          <a:ln w="57150">
+            <a:solidFill>
+              <a:srgbClr val="FF0000"/>
+            </a:solidFill>
+          </a:ln>
+        </p:spPr>
+        <p:style>
+          <a:lnRef idx="3">
+            <a:schemeClr val="dk1"/>
+          </a:lnRef>
+          <a:fillRef idx="0">
+            <a:schemeClr val="dk1"/>
+          </a:fillRef>
+          <a:effectRef idx="2">
+            <a:schemeClr val="dk1"/>
+          </a:effectRef>
+          <a:fontRef idx="minor">
+            <a:schemeClr val="tx1"/>
+          </a:fontRef>
+        </p:style>
+      </p:cxnSp>
+      <p:sp>
+        <p:nvSpPr>
+          <p:cNvPr id="7" name="文本框 6">
+            <a:extLst>
+              <a:ext uri="{FF2B5EF4-FFF2-40B4-BE49-F238E27FC236}">
+                <a16:creationId xmlns:a16="http://schemas.microsoft.com/office/drawing/2014/main" id="{7FAD3969-28BD-4F38-8104-C5A7B916391F}"/>
+              </a:ext>
+            </a:extLst>
+          </p:cNvPr>
+          <p:cNvSpPr txBox="1"/>
+          <p:nvPr/>
+        </p:nvSpPr>
+        <p:spPr>
+          <a:xfrm>
+            <a:off x="165653" y="5616470"/>
+            <a:ext cx="2828507" cy="646331"/>
+          </a:xfrm>
+          <a:prstGeom prst="rect">
+            <a:avLst/>
+          </a:prstGeom>
+          <a:noFill/>
+        </p:spPr>
+        <p:txBody>
+          <a:bodyPr wrap="square" rtlCol="0">
+            <a:spAutoFit/>
+          </a:bodyPr>
+          <a:lstStyle/>
+          <a:p>
+            <a:pPr algn="ctr"/>
+            <a:r>
+              <a:rPr lang="en-AU" altLang="zh-CN" dirty="0"/>
+              <a:t>two hidden neuron</a:t>
+            </a:r>
+          </a:p>
+          <a:p>
+            <a:pPr algn="ctr"/>
+            <a:r>
+              <a:rPr lang="en-AU" altLang="zh-CN" dirty="0"/>
+              <a:t>one live one frozen</a:t>
+            </a:r>
+            <a:endParaRPr lang="zh-CN" altLang="en-US" dirty="0"/>
+          </a:p>
+        </p:txBody>
+      </p:sp>
+      <p:sp>
+        <p:nvSpPr>
+          <p:cNvPr id="8" name="流程图: 接点 7">
+            <a:extLst>
+              <a:ext uri="{FF2B5EF4-FFF2-40B4-BE49-F238E27FC236}">
+                <a16:creationId xmlns:a16="http://schemas.microsoft.com/office/drawing/2014/main" id="{E6FE5D74-FC78-4DD2-B425-D68F95595F80}"/>
+              </a:ext>
+            </a:extLst>
+          </p:cNvPr>
+          <p:cNvSpPr/>
+          <p:nvPr/>
+        </p:nvSpPr>
+        <p:spPr>
+          <a:xfrm>
+            <a:off x="2628530" y="1081643"/>
+            <a:ext cx="1182847" cy="1124125"/>
+          </a:xfrm>
+          <a:prstGeom prst="flowChartConnector">
+            <a:avLst/>
+          </a:prstGeom>
+          <a:solidFill>
+            <a:schemeClr val="accent1">
+              <a:lumMod val="40000"/>
+              <a:lumOff val="60000"/>
+              <a:alpha val="50000"/>
+            </a:schemeClr>
+          </a:solidFill>
+          <a:ln>
+            <a:noFill/>
+          </a:ln>
+        </p:spPr>
+        <p:style>
+          <a:lnRef idx="0">
+            <a:scrgbClr r="0" g="0" b="0"/>
+          </a:lnRef>
+          <a:fillRef idx="0">
+            <a:scrgbClr r="0" g="0" b="0"/>
+          </a:fillRef>
+          <a:effectRef idx="0">
+            <a:scrgbClr r="0" g="0" b="0"/>
+          </a:effectRef>
+          <a:fontRef idx="minor">
+            <a:schemeClr val="lt1"/>
+          </a:fontRef>
+        </p:style>
+        <p:txBody>
+          <a:bodyPr rtlCol="0" anchor="ctr"/>
+          <a:lstStyle/>
+          <a:p>
+            <a:pPr algn="ctr"/>
+            <a:endParaRPr lang="zh-CN" altLang="en-US"/>
+          </a:p>
+        </p:txBody>
+      </p:sp>
+      <p:sp>
+        <p:nvSpPr>
+          <p:cNvPr id="9" name="文本框 8">
+            <a:extLst>
+              <a:ext uri="{FF2B5EF4-FFF2-40B4-BE49-F238E27FC236}">
+                <a16:creationId xmlns:a16="http://schemas.microsoft.com/office/drawing/2014/main" id="{9972AC1D-0942-4639-8A9C-DA363906C722}"/>
+              </a:ext>
+            </a:extLst>
+          </p:cNvPr>
+          <p:cNvSpPr txBox="1"/>
+          <p:nvPr/>
+        </p:nvSpPr>
+        <p:spPr>
+          <a:xfrm>
+            <a:off x="2779530" y="1320539"/>
+            <a:ext cx="914400" cy="646331"/>
+          </a:xfrm>
+          <a:prstGeom prst="rect">
+            <a:avLst/>
+          </a:prstGeom>
+          <a:noFill/>
+        </p:spPr>
+        <p:txBody>
+          <a:bodyPr wrap="square" rtlCol="0">
+            <a:spAutoFit/>
+          </a:bodyPr>
+          <a:lstStyle/>
+          <a:p>
+            <a:pPr algn="ctr"/>
+            <a:r>
+              <a:rPr lang="en-AU" altLang="zh-CN" dirty="0"/>
+              <a:t>hidden</a:t>
+            </a:r>
+          </a:p>
+          <a:p>
+            <a:pPr algn="ctr"/>
+            <a:r>
+              <a:rPr lang="en-AU" altLang="zh-CN" dirty="0"/>
+              <a:t>neuron</a:t>
+            </a:r>
+            <a:endParaRPr lang="zh-CN" altLang="en-US" dirty="0"/>
+          </a:p>
+        </p:txBody>
+      </p:sp>
+      <p:cxnSp>
+        <p:nvCxnSpPr>
+          <p:cNvPr id="10" name="直接连接符 9">
+            <a:extLst>
+              <a:ext uri="{FF2B5EF4-FFF2-40B4-BE49-F238E27FC236}">
+                <a16:creationId xmlns:a16="http://schemas.microsoft.com/office/drawing/2014/main" id="{6C861AED-75F6-467E-8680-0022BEBE1A36}"/>
+              </a:ext>
+            </a:extLst>
+          </p:cNvPr>
+          <p:cNvCxnSpPr/>
+          <p:nvPr/>
+        </p:nvCxnSpPr>
+        <p:spPr>
+          <a:xfrm>
+            <a:off x="2111211" y="1001759"/>
+            <a:ext cx="597714" cy="385894"/>
+          </a:xfrm>
+          <a:prstGeom prst="line">
+            <a:avLst/>
+          </a:prstGeom>
+          <a:ln w="57150">
+            <a:solidFill>
+              <a:schemeClr val="accent5">
+                <a:lumMod val="40000"/>
+                <a:lumOff val="60000"/>
+              </a:schemeClr>
+            </a:solidFill>
+          </a:ln>
+        </p:spPr>
+        <p:style>
+          <a:lnRef idx="3">
+            <a:schemeClr val="accent2"/>
+          </a:lnRef>
+          <a:fillRef idx="0">
+            <a:schemeClr val="accent2"/>
+          </a:fillRef>
+          <a:effectRef idx="2">
+            <a:schemeClr val="accent2"/>
+          </a:effectRef>
+          <a:fontRef idx="minor">
+            <a:schemeClr val="tx1"/>
+          </a:fontRef>
+        </p:style>
+      </p:cxnSp>
+      <p:cxnSp>
+        <p:nvCxnSpPr>
+          <p:cNvPr id="11" name="直接连接符 10">
+            <a:extLst>
+              <a:ext uri="{FF2B5EF4-FFF2-40B4-BE49-F238E27FC236}">
+                <a16:creationId xmlns:a16="http://schemas.microsoft.com/office/drawing/2014/main" id="{D8D78B6C-3AD1-487C-B168-03C8BF206868}"/>
+              </a:ext>
+            </a:extLst>
+          </p:cNvPr>
+          <p:cNvCxnSpPr>
+            <a:cxnSpLocks/>
+            <a:stCxn id="8" idx="3"/>
+            <a:endCxn id="3" idx="7"/>
+          </p:cNvCxnSpPr>
+          <p:nvPr/>
+        </p:nvCxnSpPr>
+        <p:spPr>
+          <a:xfrm flipH="1">
+            <a:off x="2058935" y="2041144"/>
+            <a:ext cx="742819" cy="2633853"/>
+          </a:xfrm>
+          <a:prstGeom prst="line">
+            <a:avLst/>
+          </a:prstGeom>
+          <a:ln w="57150">
+            <a:solidFill>
+              <a:srgbClr val="FF0000"/>
+            </a:solidFill>
+          </a:ln>
+        </p:spPr>
+        <p:style>
+          <a:lnRef idx="3">
+            <a:schemeClr val="dk1"/>
+          </a:lnRef>
+          <a:fillRef idx="0">
+            <a:schemeClr val="dk1"/>
+          </a:fillRef>
+          <a:effectRef idx="2">
+            <a:schemeClr val="dk1"/>
+          </a:effectRef>
+          <a:fontRef idx="minor">
+            <a:schemeClr val="tx1"/>
+          </a:fontRef>
+        </p:style>
+      </p:cxnSp>
+      <p:sp>
+        <p:nvSpPr>
+          <p:cNvPr id="16" name="流程图: 接点 15">
+            <a:extLst>
+              <a:ext uri="{FF2B5EF4-FFF2-40B4-BE49-F238E27FC236}">
+                <a16:creationId xmlns:a16="http://schemas.microsoft.com/office/drawing/2014/main" id="{2F640AB1-FB71-4B14-B623-69351BDE521B}"/>
+              </a:ext>
+            </a:extLst>
+          </p:cNvPr>
+          <p:cNvSpPr/>
+          <p:nvPr/>
+        </p:nvSpPr>
+        <p:spPr>
+          <a:xfrm>
+            <a:off x="4483944" y="1085386"/>
+            <a:ext cx="1182847" cy="1124125"/>
+          </a:xfrm>
+          <a:prstGeom prst="flowChartConnector">
+            <a:avLst/>
+          </a:prstGeom>
+          <a:solidFill>
+            <a:srgbClr val="FF0000">
+              <a:alpha val="50000"/>
+            </a:srgbClr>
+          </a:solidFill>
+          <a:ln>
+            <a:noFill/>
+          </a:ln>
+        </p:spPr>
+        <p:style>
+          <a:lnRef idx="0">
+            <a:scrgbClr r="0" g="0" b="0"/>
+          </a:lnRef>
+          <a:fillRef idx="0">
+            <a:scrgbClr r="0" g="0" b="0"/>
+          </a:fillRef>
+          <a:effectRef idx="0">
+            <a:scrgbClr r="0" g="0" b="0"/>
+          </a:effectRef>
+          <a:fontRef idx="minor">
+            <a:schemeClr val="lt1"/>
+          </a:fontRef>
+        </p:style>
+        <p:txBody>
+          <a:bodyPr rtlCol="0" anchor="ctr"/>
+          <a:lstStyle/>
+          <a:p>
+            <a:pPr algn="ctr"/>
+            <a:endParaRPr lang="zh-CN" altLang="en-US"/>
+          </a:p>
+        </p:txBody>
+      </p:sp>
+      <p:sp>
+        <p:nvSpPr>
+          <p:cNvPr id="17" name="文本框 16">
+            <a:extLst>
+              <a:ext uri="{FF2B5EF4-FFF2-40B4-BE49-F238E27FC236}">
+                <a16:creationId xmlns:a16="http://schemas.microsoft.com/office/drawing/2014/main" id="{97DC68DA-5C38-4946-8C41-1D53C2D81622}"/>
+              </a:ext>
+            </a:extLst>
+          </p:cNvPr>
+          <p:cNvSpPr txBox="1"/>
+          <p:nvPr/>
+        </p:nvSpPr>
+        <p:spPr>
+          <a:xfrm>
+            <a:off x="4634944" y="1324282"/>
+            <a:ext cx="914400" cy="646331"/>
+          </a:xfrm>
+          <a:prstGeom prst="rect">
+            <a:avLst/>
+          </a:prstGeom>
+          <a:noFill/>
+        </p:spPr>
+        <p:txBody>
+          <a:bodyPr wrap="square" rtlCol="0">
+            <a:spAutoFit/>
+          </a:bodyPr>
+          <a:lstStyle/>
+          <a:p>
+            <a:pPr algn="ctr"/>
+            <a:r>
+              <a:rPr lang="en-AU" altLang="zh-CN" dirty="0"/>
+              <a:t>hidden</a:t>
+            </a:r>
+          </a:p>
+          <a:p>
+            <a:pPr algn="ctr"/>
+            <a:r>
+              <a:rPr lang="en-AU" altLang="zh-CN" dirty="0"/>
+              <a:t>neuron</a:t>
+            </a:r>
+            <a:endParaRPr lang="zh-CN" altLang="en-US" dirty="0"/>
+          </a:p>
+        </p:txBody>
+      </p:sp>
+      <p:cxnSp>
+        <p:nvCxnSpPr>
+          <p:cNvPr id="19" name="直接连接符 18">
+            <a:extLst>
+              <a:ext uri="{FF2B5EF4-FFF2-40B4-BE49-F238E27FC236}">
+                <a16:creationId xmlns:a16="http://schemas.microsoft.com/office/drawing/2014/main" id="{F90548D8-152A-4F9A-BD34-0911EE5FD8B8}"/>
+              </a:ext>
+            </a:extLst>
+          </p:cNvPr>
+          <p:cNvCxnSpPr>
+            <a:endCxn id="16" idx="1"/>
+          </p:cNvCxnSpPr>
+          <p:nvPr/>
+        </p:nvCxnSpPr>
+        <p:spPr>
+          <a:xfrm>
+            <a:off x="2131134" y="550506"/>
+            <a:ext cx="2526034" cy="699504"/>
+          </a:xfrm>
+          <a:prstGeom prst="line">
+            <a:avLst/>
+          </a:prstGeom>
+          <a:ln w="57150">
+            <a:solidFill>
+              <a:schemeClr val="accent6"/>
+            </a:solidFill>
+          </a:ln>
+        </p:spPr>
+        <p:style>
+          <a:lnRef idx="3">
+            <a:schemeClr val="dk1"/>
+          </a:lnRef>
+          <a:fillRef idx="0">
+            <a:schemeClr val="dk1"/>
+          </a:fillRef>
+          <a:effectRef idx="2">
+            <a:schemeClr val="dk1"/>
+          </a:effectRef>
+          <a:fontRef idx="minor">
+            <a:schemeClr val="tx1"/>
+          </a:fontRef>
+        </p:style>
+      </p:cxnSp>
+      <p:cxnSp>
+        <p:nvCxnSpPr>
+          <p:cNvPr id="21" name="直接连接符 20">
+            <a:extLst>
+              <a:ext uri="{FF2B5EF4-FFF2-40B4-BE49-F238E27FC236}">
+                <a16:creationId xmlns:a16="http://schemas.microsoft.com/office/drawing/2014/main" id="{AC6733E5-03E1-49E5-AC1F-C3F18A8F7317}"/>
+              </a:ext>
+            </a:extLst>
+          </p:cNvPr>
+          <p:cNvCxnSpPr>
+            <a:stCxn id="3" idx="6"/>
+            <a:endCxn id="16" idx="4"/>
+          </p:cNvCxnSpPr>
+          <p:nvPr/>
+        </p:nvCxnSpPr>
+        <p:spPr>
+          <a:xfrm flipV="1">
+            <a:off x="2232159" y="2209511"/>
+            <a:ext cx="2843209" cy="2862925"/>
+          </a:xfrm>
+          <a:prstGeom prst="line">
+            <a:avLst/>
+          </a:prstGeom>
+          <a:ln w="57150"/>
+        </p:spPr>
+        <p:style>
+          <a:lnRef idx="3">
+            <a:schemeClr val="dk1"/>
+          </a:lnRef>
+          <a:fillRef idx="0">
+            <a:schemeClr val="dk1"/>
+          </a:fillRef>
+          <a:effectRef idx="2">
+            <a:schemeClr val="dk1"/>
+          </a:effectRef>
+          <a:fontRef idx="minor">
+            <a:schemeClr val="tx1"/>
+          </a:fontRef>
+        </p:style>
+      </p:cxnSp>
+      <p:cxnSp>
+        <p:nvCxnSpPr>
+          <p:cNvPr id="23" name="直接连接符 22">
+            <a:extLst>
+              <a:ext uri="{FF2B5EF4-FFF2-40B4-BE49-F238E27FC236}">
+                <a16:creationId xmlns:a16="http://schemas.microsoft.com/office/drawing/2014/main" id="{36CBDAB3-C8D8-42A3-8CF1-DA7B40F5D405}"/>
+              </a:ext>
+            </a:extLst>
+          </p:cNvPr>
+          <p:cNvCxnSpPr>
+            <a:stCxn id="8" idx="6"/>
+            <a:endCxn id="16" idx="2"/>
+          </p:cNvCxnSpPr>
+          <p:nvPr/>
+        </p:nvCxnSpPr>
+        <p:spPr>
+          <a:xfrm>
+            <a:off x="3811377" y="1643706"/>
+            <a:ext cx="672567" cy="3743"/>
+          </a:xfrm>
+          <a:prstGeom prst="line">
+            <a:avLst/>
+          </a:prstGeom>
+          <a:ln w="57150">
+            <a:solidFill>
+              <a:schemeClr val="accent6"/>
+            </a:solidFill>
+          </a:ln>
+        </p:spPr>
+        <p:style>
+          <a:lnRef idx="3">
+            <a:schemeClr val="dk1"/>
+          </a:lnRef>
+          <a:fillRef idx="0">
+            <a:schemeClr val="dk1"/>
+          </a:fillRef>
+          <a:effectRef idx="2">
+            <a:schemeClr val="dk1"/>
+          </a:effectRef>
+          <a:fontRef idx="minor">
+            <a:schemeClr val="tx1"/>
+          </a:fontRef>
+        </p:style>
+      </p:cxnSp>
+      <p:sp>
+        <p:nvSpPr>
+          <p:cNvPr id="24" name="流程图: 接点 23">
+            <a:extLst>
+              <a:ext uri="{FF2B5EF4-FFF2-40B4-BE49-F238E27FC236}">
+                <a16:creationId xmlns:a16="http://schemas.microsoft.com/office/drawing/2014/main" id="{4E16F92F-2AA0-40ED-8CD0-B951B4C1023E}"/>
+              </a:ext>
+            </a:extLst>
+          </p:cNvPr>
+          <p:cNvSpPr/>
+          <p:nvPr/>
+        </p:nvSpPr>
+        <p:spPr>
+          <a:xfrm>
+            <a:off x="7181000" y="200394"/>
+            <a:ext cx="1182847" cy="1124125"/>
+          </a:xfrm>
+          <a:prstGeom prst="flowChartConnector">
+            <a:avLst/>
+          </a:prstGeom>
+          <a:solidFill>
+            <a:schemeClr val="accent2">
+              <a:alpha val="50000"/>
+            </a:schemeClr>
+          </a:solidFill>
+          <a:ln>
+            <a:noFill/>
+          </a:ln>
+        </p:spPr>
+        <p:style>
+          <a:lnRef idx="0">
+            <a:scrgbClr r="0" g="0" b="0"/>
+          </a:lnRef>
+          <a:fillRef idx="0">
+            <a:scrgbClr r="0" g="0" b="0"/>
+          </a:fillRef>
+          <a:effectRef idx="0">
+            <a:scrgbClr r="0" g="0" b="0"/>
+          </a:effectRef>
+          <a:fontRef idx="minor">
+            <a:schemeClr val="lt1"/>
+          </a:fontRef>
+        </p:style>
+        <p:txBody>
+          <a:bodyPr rtlCol="0" anchor="ctr"/>
+          <a:lstStyle/>
+          <a:p>
+            <a:pPr algn="ctr"/>
+            <a:endParaRPr lang="zh-CN" altLang="en-US"/>
+          </a:p>
+        </p:txBody>
+      </p:sp>
+      <p:sp>
+        <p:nvSpPr>
+          <p:cNvPr id="25" name="流程图: 接点 24">
+            <a:extLst>
+              <a:ext uri="{FF2B5EF4-FFF2-40B4-BE49-F238E27FC236}">
+                <a16:creationId xmlns:a16="http://schemas.microsoft.com/office/drawing/2014/main" id="{3C9FE632-6F78-4B12-A3B5-7011EE839DC6}"/>
+              </a:ext>
+            </a:extLst>
+          </p:cNvPr>
+          <p:cNvSpPr/>
+          <p:nvPr/>
+        </p:nvSpPr>
+        <p:spPr>
+          <a:xfrm>
+            <a:off x="7241829" y="4510373"/>
+            <a:ext cx="1182846" cy="1124125"/>
+          </a:xfrm>
+          <a:prstGeom prst="flowChartConnector">
+            <a:avLst/>
+          </a:prstGeom>
+          <a:solidFill>
+            <a:schemeClr val="accent2">
+              <a:alpha val="50000"/>
+            </a:schemeClr>
+          </a:solidFill>
+          <a:ln>
+            <a:noFill/>
+          </a:ln>
+        </p:spPr>
+        <p:style>
+          <a:lnRef idx="0">
+            <a:scrgbClr r="0" g="0" b="0"/>
+          </a:lnRef>
+          <a:fillRef idx="0">
+            <a:scrgbClr r="0" g="0" b="0"/>
+          </a:fillRef>
+          <a:effectRef idx="0">
+            <a:scrgbClr r="0" g="0" b="0"/>
+          </a:effectRef>
+          <a:fontRef idx="minor">
+            <a:schemeClr val="lt1"/>
+          </a:fontRef>
+        </p:style>
+        <p:txBody>
+          <a:bodyPr rtlCol="0" anchor="ctr"/>
+          <a:lstStyle/>
+          <a:p>
+            <a:pPr algn="ctr"/>
+            <a:endParaRPr lang="zh-CN" altLang="en-US"/>
+          </a:p>
+        </p:txBody>
+      </p:sp>
+      <p:sp>
+        <p:nvSpPr>
+          <p:cNvPr id="26" name="文本框 25">
+            <a:extLst>
+              <a:ext uri="{FF2B5EF4-FFF2-40B4-BE49-F238E27FC236}">
+                <a16:creationId xmlns:a16="http://schemas.microsoft.com/office/drawing/2014/main" id="{D2306AF3-8140-44B0-9899-071CE2B946C2}"/>
+              </a:ext>
+            </a:extLst>
+          </p:cNvPr>
+          <p:cNvSpPr txBox="1"/>
+          <p:nvPr/>
+        </p:nvSpPr>
+        <p:spPr>
+          <a:xfrm>
+            <a:off x="7315223" y="439290"/>
+            <a:ext cx="914400" cy="646331"/>
+          </a:xfrm>
+          <a:prstGeom prst="rect">
+            <a:avLst/>
+          </a:prstGeom>
+          <a:noFill/>
+        </p:spPr>
+        <p:txBody>
+          <a:bodyPr wrap="square" rtlCol="0">
+            <a:spAutoFit/>
+          </a:bodyPr>
+          <a:lstStyle/>
+          <a:p>
+            <a:pPr algn="ctr"/>
+            <a:r>
+              <a:rPr lang="en-AU" altLang="zh-CN"/>
+              <a:t>i</a:t>
+            </a:r>
+            <a:r>
+              <a:rPr lang="en-AU" altLang="zh-CN" dirty="0"/>
+              <a:t>nput</a:t>
+            </a:r>
+          </a:p>
+          <a:p>
+            <a:pPr algn="ctr"/>
+            <a:r>
+              <a:rPr lang="en-AU" altLang="zh-CN"/>
+              <a:t>neuro</a:t>
+            </a:r>
+            <a:r>
+              <a:rPr lang="en-AU" altLang="zh-CN" dirty="0"/>
+              <a:t>n</a:t>
+            </a:r>
+            <a:endParaRPr lang="zh-CN" altLang="en-US" dirty="0"/>
+          </a:p>
+        </p:txBody>
+      </p:sp>
+      <p:sp>
+        <p:nvSpPr>
+          <p:cNvPr id="27" name="文本框 26">
+            <a:extLst>
+              <a:ext uri="{FF2B5EF4-FFF2-40B4-BE49-F238E27FC236}">
+                <a16:creationId xmlns:a16="http://schemas.microsoft.com/office/drawing/2014/main" id="{662EADCF-7051-43EC-8EDD-0935E9343810}"/>
+              </a:ext>
+            </a:extLst>
+          </p:cNvPr>
+          <p:cNvSpPr txBox="1"/>
+          <p:nvPr/>
+        </p:nvSpPr>
+        <p:spPr>
+          <a:xfrm>
+            <a:off x="7376051" y="4749269"/>
+            <a:ext cx="914400" cy="646331"/>
+          </a:xfrm>
+          <a:prstGeom prst="rect">
+            <a:avLst/>
+          </a:prstGeom>
+          <a:noFill/>
+        </p:spPr>
+        <p:txBody>
+          <a:bodyPr wrap="square" rtlCol="0">
+            <a:spAutoFit/>
+          </a:bodyPr>
+          <a:lstStyle/>
+          <a:p>
+            <a:pPr algn="ctr"/>
+            <a:r>
+              <a:rPr lang="en-AU" altLang="zh-CN" dirty="0"/>
+              <a:t>output</a:t>
+            </a:r>
+          </a:p>
+          <a:p>
+            <a:pPr algn="ctr"/>
+            <a:r>
+              <a:rPr lang="en-AU" altLang="zh-CN" dirty="0"/>
+              <a:t>neuron</a:t>
+            </a:r>
+            <a:endParaRPr lang="zh-CN" altLang="en-US" dirty="0"/>
+          </a:p>
+        </p:txBody>
+      </p:sp>
+      <p:cxnSp>
+        <p:nvCxnSpPr>
+          <p:cNvPr id="28" name="直接连接符 27">
+            <a:extLst>
+              <a:ext uri="{FF2B5EF4-FFF2-40B4-BE49-F238E27FC236}">
+                <a16:creationId xmlns:a16="http://schemas.microsoft.com/office/drawing/2014/main" id="{A2749CB0-7728-4720-9736-4A4351ADFCD6}"/>
+              </a:ext>
+            </a:extLst>
+          </p:cNvPr>
+          <p:cNvCxnSpPr>
+            <a:stCxn id="24" idx="4"/>
+            <a:endCxn id="25" idx="0"/>
+          </p:cNvCxnSpPr>
+          <p:nvPr/>
+        </p:nvCxnSpPr>
+        <p:spPr>
+          <a:xfrm>
+            <a:off x="7772424" y="1324519"/>
+            <a:ext cx="60828" cy="3185854"/>
+          </a:xfrm>
+          <a:prstGeom prst="line">
+            <a:avLst/>
+          </a:prstGeom>
+          <a:ln w="57150">
+            <a:solidFill>
+              <a:srgbClr val="FF0000"/>
+            </a:solidFill>
+          </a:ln>
+        </p:spPr>
+        <p:style>
+          <a:lnRef idx="3">
+            <a:schemeClr val="dk1"/>
+          </a:lnRef>
+          <a:fillRef idx="0">
+            <a:schemeClr val="dk1"/>
+          </a:fillRef>
+          <a:effectRef idx="2">
+            <a:schemeClr val="dk1"/>
+          </a:effectRef>
+          <a:fontRef idx="minor">
+            <a:schemeClr val="tx1"/>
+          </a:fontRef>
+        </p:style>
+      </p:cxnSp>
+      <p:sp>
+        <p:nvSpPr>
+          <p:cNvPr id="29" name="文本框 28">
+            <a:extLst>
+              <a:ext uri="{FF2B5EF4-FFF2-40B4-BE49-F238E27FC236}">
+                <a16:creationId xmlns:a16="http://schemas.microsoft.com/office/drawing/2014/main" id="{079616E1-93A1-4E8F-9D35-F8D509BC18A5}"/>
+              </a:ext>
+            </a:extLst>
+          </p:cNvPr>
+          <p:cNvSpPr txBox="1"/>
+          <p:nvPr/>
+        </p:nvSpPr>
+        <p:spPr>
+          <a:xfrm>
+            <a:off x="6358169" y="5616470"/>
+            <a:ext cx="2828507" cy="369332"/>
+          </a:xfrm>
+          <a:prstGeom prst="rect">
+            <a:avLst/>
+          </a:prstGeom>
+          <a:noFill/>
+        </p:spPr>
+        <p:txBody>
+          <a:bodyPr wrap="square" rtlCol="0">
+            <a:spAutoFit/>
+          </a:bodyPr>
+          <a:lstStyle/>
+          <a:p>
+            <a:pPr algn="ctr"/>
+            <a:r>
+              <a:rPr lang="en-AU" altLang="zh-CN" dirty="0"/>
+              <a:t>Two frozen hidden neuron</a:t>
+            </a:r>
+          </a:p>
+        </p:txBody>
+      </p:sp>
+      <p:sp>
+        <p:nvSpPr>
+          <p:cNvPr id="30" name="流程图: 接点 29">
+            <a:extLst>
+              <a:ext uri="{FF2B5EF4-FFF2-40B4-BE49-F238E27FC236}">
+                <a16:creationId xmlns:a16="http://schemas.microsoft.com/office/drawing/2014/main" id="{C515EDCB-04F1-4E15-B66D-BB27083BB5CE}"/>
+              </a:ext>
+            </a:extLst>
+          </p:cNvPr>
+          <p:cNvSpPr/>
+          <p:nvPr/>
+        </p:nvSpPr>
+        <p:spPr>
+          <a:xfrm>
+            <a:off x="8821046" y="1081643"/>
+            <a:ext cx="1182847" cy="1124125"/>
+          </a:xfrm>
+          <a:prstGeom prst="flowChartConnector">
+            <a:avLst/>
+          </a:prstGeom>
+          <a:solidFill>
+            <a:schemeClr val="accent1">
+              <a:lumMod val="40000"/>
+              <a:lumOff val="60000"/>
+              <a:alpha val="50000"/>
+            </a:schemeClr>
+          </a:solidFill>
+          <a:ln>
+            <a:noFill/>
+          </a:ln>
+        </p:spPr>
+        <p:style>
+          <a:lnRef idx="0">
+            <a:scrgbClr r="0" g="0" b="0"/>
+          </a:lnRef>
+          <a:fillRef idx="0">
+            <a:scrgbClr r="0" g="0" b="0"/>
+          </a:fillRef>
+          <a:effectRef idx="0">
+            <a:scrgbClr r="0" g="0" b="0"/>
+          </a:effectRef>
+          <a:fontRef idx="minor">
+            <a:schemeClr val="lt1"/>
+          </a:fontRef>
+        </p:style>
+        <p:txBody>
+          <a:bodyPr rtlCol="0" anchor="ctr"/>
+          <a:lstStyle/>
+          <a:p>
+            <a:pPr algn="ctr"/>
+            <a:endParaRPr lang="zh-CN" altLang="en-US"/>
+          </a:p>
+        </p:txBody>
+      </p:sp>
+      <p:sp>
+        <p:nvSpPr>
+          <p:cNvPr id="31" name="文本框 30">
+            <a:extLst>
+              <a:ext uri="{FF2B5EF4-FFF2-40B4-BE49-F238E27FC236}">
+                <a16:creationId xmlns:a16="http://schemas.microsoft.com/office/drawing/2014/main" id="{CA30F94A-F8DF-4E7A-8DED-8F7F237963F5}"/>
+              </a:ext>
+            </a:extLst>
+          </p:cNvPr>
+          <p:cNvSpPr txBox="1"/>
+          <p:nvPr/>
+        </p:nvSpPr>
+        <p:spPr>
+          <a:xfrm>
+            <a:off x="8972046" y="1320539"/>
+            <a:ext cx="914400" cy="646331"/>
+          </a:xfrm>
+          <a:prstGeom prst="rect">
+            <a:avLst/>
+          </a:prstGeom>
+          <a:noFill/>
+        </p:spPr>
+        <p:txBody>
+          <a:bodyPr wrap="square" rtlCol="0">
+            <a:spAutoFit/>
+          </a:bodyPr>
+          <a:lstStyle/>
+          <a:p>
+            <a:pPr algn="ctr"/>
+            <a:r>
+              <a:rPr lang="en-AU" altLang="zh-CN" dirty="0"/>
+              <a:t>hidden</a:t>
+            </a:r>
+          </a:p>
+          <a:p>
+            <a:pPr algn="ctr"/>
+            <a:r>
+              <a:rPr lang="en-AU" altLang="zh-CN" dirty="0"/>
+              <a:t>neuron</a:t>
+            </a:r>
+            <a:endParaRPr lang="zh-CN" altLang="en-US" dirty="0"/>
+          </a:p>
+        </p:txBody>
+      </p:sp>
+      <p:cxnSp>
+        <p:nvCxnSpPr>
+          <p:cNvPr id="32" name="直接连接符 31">
+            <a:extLst>
+              <a:ext uri="{FF2B5EF4-FFF2-40B4-BE49-F238E27FC236}">
+                <a16:creationId xmlns:a16="http://schemas.microsoft.com/office/drawing/2014/main" id="{4FF79EFB-0693-4BE8-9E1A-23CF4AF5C288}"/>
+              </a:ext>
+            </a:extLst>
+          </p:cNvPr>
+          <p:cNvCxnSpPr/>
+          <p:nvPr/>
+        </p:nvCxnSpPr>
+        <p:spPr>
+          <a:xfrm>
+            <a:off x="8303727" y="1001759"/>
+            <a:ext cx="597714" cy="385894"/>
+          </a:xfrm>
+          <a:prstGeom prst="line">
+            <a:avLst/>
+          </a:prstGeom>
+          <a:ln w="57150">
+            <a:solidFill>
+              <a:schemeClr val="accent5">
+                <a:lumMod val="40000"/>
+                <a:lumOff val="60000"/>
+              </a:schemeClr>
+            </a:solidFill>
+          </a:ln>
+        </p:spPr>
+        <p:style>
+          <a:lnRef idx="3">
+            <a:schemeClr val="accent2"/>
+          </a:lnRef>
+          <a:fillRef idx="0">
+            <a:schemeClr val="accent2"/>
+          </a:fillRef>
+          <a:effectRef idx="2">
+            <a:schemeClr val="accent2"/>
+          </a:effectRef>
+          <a:fontRef idx="minor">
+            <a:schemeClr val="tx1"/>
+          </a:fontRef>
+        </p:style>
+      </p:cxnSp>
+      <p:cxnSp>
+        <p:nvCxnSpPr>
+          <p:cNvPr id="33" name="直接连接符 32">
+            <a:extLst>
+              <a:ext uri="{FF2B5EF4-FFF2-40B4-BE49-F238E27FC236}">
+                <a16:creationId xmlns:a16="http://schemas.microsoft.com/office/drawing/2014/main" id="{AEC8696D-9660-48EA-9EE5-FC32F70F726F}"/>
+              </a:ext>
+            </a:extLst>
+          </p:cNvPr>
+          <p:cNvCxnSpPr>
+            <a:cxnSpLocks/>
+            <a:stCxn id="30" idx="3"/>
+            <a:endCxn id="25" idx="7"/>
+          </p:cNvCxnSpPr>
+          <p:nvPr/>
+        </p:nvCxnSpPr>
+        <p:spPr>
+          <a:xfrm flipH="1">
+            <a:off x="8251451" y="2041144"/>
+            <a:ext cx="742819" cy="2633853"/>
+          </a:xfrm>
+          <a:prstGeom prst="line">
+            <a:avLst/>
+          </a:prstGeom>
+          <a:ln w="57150">
+            <a:solidFill>
+              <a:srgbClr val="FF0000"/>
+            </a:solidFill>
+          </a:ln>
+        </p:spPr>
+        <p:style>
+          <a:lnRef idx="3">
+            <a:schemeClr val="dk1"/>
+          </a:lnRef>
+          <a:fillRef idx="0">
+            <a:schemeClr val="dk1"/>
+          </a:fillRef>
+          <a:effectRef idx="2">
+            <a:schemeClr val="dk1"/>
+          </a:effectRef>
+          <a:fontRef idx="minor">
+            <a:schemeClr val="tx1"/>
+          </a:fontRef>
+        </p:style>
+      </p:cxnSp>
+      <p:sp>
+        <p:nvSpPr>
+          <p:cNvPr id="34" name="流程图: 接点 33">
+            <a:extLst>
+              <a:ext uri="{FF2B5EF4-FFF2-40B4-BE49-F238E27FC236}">
+                <a16:creationId xmlns:a16="http://schemas.microsoft.com/office/drawing/2014/main" id="{08888B1C-E206-45EB-AC57-5C5FB9A04041}"/>
+              </a:ext>
+            </a:extLst>
+          </p:cNvPr>
+          <p:cNvSpPr/>
+          <p:nvPr/>
+        </p:nvSpPr>
+        <p:spPr>
+          <a:xfrm>
+            <a:off x="10676460" y="1085386"/>
+            <a:ext cx="1182847" cy="1124125"/>
+          </a:xfrm>
+          <a:prstGeom prst="flowChartConnector">
+            <a:avLst/>
+          </a:prstGeom>
+          <a:solidFill>
+            <a:schemeClr val="accent1">
+              <a:lumMod val="40000"/>
+              <a:lumOff val="60000"/>
+              <a:alpha val="50000"/>
+            </a:schemeClr>
+          </a:solidFill>
+          <a:ln>
+            <a:noFill/>
+          </a:ln>
+        </p:spPr>
+        <p:style>
+          <a:lnRef idx="0">
+            <a:scrgbClr r="0" g="0" b="0"/>
+          </a:lnRef>
+          <a:fillRef idx="0">
+            <a:scrgbClr r="0" g="0" b="0"/>
+          </a:fillRef>
+          <a:effectRef idx="0">
+            <a:scrgbClr r="0" g="0" b="0"/>
+          </a:effectRef>
+          <a:fontRef idx="minor">
+            <a:schemeClr val="lt1"/>
+          </a:fontRef>
+        </p:style>
+        <p:txBody>
+          <a:bodyPr rtlCol="0" anchor="ctr"/>
+          <a:lstStyle/>
+          <a:p>
+            <a:pPr algn="ctr"/>
+            <a:endParaRPr lang="zh-CN" altLang="en-US"/>
+          </a:p>
+        </p:txBody>
+      </p:sp>
+      <p:sp>
+        <p:nvSpPr>
+          <p:cNvPr id="35" name="文本框 34">
+            <a:extLst>
+              <a:ext uri="{FF2B5EF4-FFF2-40B4-BE49-F238E27FC236}">
+                <a16:creationId xmlns:a16="http://schemas.microsoft.com/office/drawing/2014/main" id="{0559B6F1-513C-409F-B257-36B1F58E9342}"/>
+              </a:ext>
+            </a:extLst>
+          </p:cNvPr>
+          <p:cNvSpPr txBox="1"/>
+          <p:nvPr/>
+        </p:nvSpPr>
+        <p:spPr>
+          <a:xfrm>
+            <a:off x="10827460" y="1324282"/>
+            <a:ext cx="914400" cy="646331"/>
+          </a:xfrm>
+          <a:prstGeom prst="rect">
+            <a:avLst/>
+          </a:prstGeom>
+          <a:noFill/>
+        </p:spPr>
+        <p:txBody>
+          <a:bodyPr wrap="square" rtlCol="0">
+            <a:spAutoFit/>
+          </a:bodyPr>
+          <a:lstStyle/>
+          <a:p>
+            <a:pPr algn="ctr"/>
+            <a:r>
+              <a:rPr lang="en-AU" altLang="zh-CN" dirty="0"/>
+              <a:t>hidden</a:t>
+            </a:r>
+          </a:p>
+          <a:p>
+            <a:pPr algn="ctr"/>
+            <a:r>
+              <a:rPr lang="en-AU" altLang="zh-CN" dirty="0"/>
+              <a:t>neuron</a:t>
+            </a:r>
+            <a:endParaRPr lang="zh-CN" altLang="en-US" dirty="0"/>
+          </a:p>
+        </p:txBody>
+      </p:sp>
+      <p:cxnSp>
+        <p:nvCxnSpPr>
+          <p:cNvPr id="36" name="直接连接符 35">
+            <a:extLst>
+              <a:ext uri="{FF2B5EF4-FFF2-40B4-BE49-F238E27FC236}">
+                <a16:creationId xmlns:a16="http://schemas.microsoft.com/office/drawing/2014/main" id="{1EDFDD5A-64E1-4553-B016-138D89F17586}"/>
+              </a:ext>
+            </a:extLst>
+          </p:cNvPr>
+          <p:cNvCxnSpPr>
+            <a:endCxn id="34" idx="1"/>
+          </p:cNvCxnSpPr>
+          <p:nvPr/>
+        </p:nvCxnSpPr>
+        <p:spPr>
+          <a:xfrm>
+            <a:off x="8323650" y="550506"/>
+            <a:ext cx="2526034" cy="699504"/>
+          </a:xfrm>
+          <a:prstGeom prst="line">
+            <a:avLst/>
+          </a:prstGeom>
+          <a:ln w="57150">
+            <a:solidFill>
+              <a:schemeClr val="accent1">
+                <a:lumMod val="40000"/>
+                <a:lumOff val="60000"/>
+              </a:schemeClr>
+            </a:solidFill>
+          </a:ln>
+        </p:spPr>
+        <p:style>
+          <a:lnRef idx="3">
+            <a:schemeClr val="dk1"/>
+          </a:lnRef>
+          <a:fillRef idx="0">
+            <a:schemeClr val="dk1"/>
+          </a:fillRef>
+          <a:effectRef idx="2">
+            <a:schemeClr val="dk1"/>
+          </a:effectRef>
+          <a:fontRef idx="minor">
+            <a:schemeClr val="tx1"/>
+          </a:fontRef>
+        </p:style>
+      </p:cxnSp>
+      <p:cxnSp>
+        <p:nvCxnSpPr>
+          <p:cNvPr id="37" name="直接连接符 36">
+            <a:extLst>
+              <a:ext uri="{FF2B5EF4-FFF2-40B4-BE49-F238E27FC236}">
+                <a16:creationId xmlns:a16="http://schemas.microsoft.com/office/drawing/2014/main" id="{63F90DB1-27B8-4E8F-93B0-71CB0C1C1285}"/>
+              </a:ext>
+            </a:extLst>
+          </p:cNvPr>
+          <p:cNvCxnSpPr>
+            <a:stCxn id="25" idx="6"/>
+            <a:endCxn id="34" idx="4"/>
+          </p:cNvCxnSpPr>
+          <p:nvPr/>
+        </p:nvCxnSpPr>
+        <p:spPr>
+          <a:xfrm flipV="1">
+            <a:off x="8424675" y="2209511"/>
+            <a:ext cx="2843209" cy="2862925"/>
+          </a:xfrm>
+          <a:prstGeom prst="line">
+            <a:avLst/>
+          </a:prstGeom>
+          <a:ln w="57150">
+            <a:solidFill>
+              <a:srgbClr val="FF0000"/>
+            </a:solidFill>
+          </a:ln>
+        </p:spPr>
+        <p:style>
+          <a:lnRef idx="3">
+            <a:schemeClr val="dk1"/>
+          </a:lnRef>
+          <a:fillRef idx="0">
+            <a:schemeClr val="dk1"/>
+          </a:fillRef>
+          <a:effectRef idx="2">
+            <a:schemeClr val="dk1"/>
+          </a:effectRef>
+          <a:fontRef idx="minor">
+            <a:schemeClr val="tx1"/>
+          </a:fontRef>
+        </p:style>
+      </p:cxnSp>
+      <p:cxnSp>
+        <p:nvCxnSpPr>
+          <p:cNvPr id="38" name="直接连接符 37">
+            <a:extLst>
+              <a:ext uri="{FF2B5EF4-FFF2-40B4-BE49-F238E27FC236}">
+                <a16:creationId xmlns:a16="http://schemas.microsoft.com/office/drawing/2014/main" id="{D3A01CC2-C98E-48AF-9D93-12A60BFC9301}"/>
+              </a:ext>
+            </a:extLst>
+          </p:cNvPr>
+          <p:cNvCxnSpPr>
+            <a:stCxn id="30" idx="6"/>
+            <a:endCxn id="34" idx="2"/>
+          </p:cNvCxnSpPr>
+          <p:nvPr/>
+        </p:nvCxnSpPr>
+        <p:spPr>
+          <a:xfrm>
+            <a:off x="10003893" y="1643706"/>
+            <a:ext cx="672567" cy="3743"/>
+          </a:xfrm>
+          <a:prstGeom prst="line">
+            <a:avLst/>
+          </a:prstGeom>
+          <a:ln w="57150">
+            <a:solidFill>
+              <a:schemeClr val="accent1">
+                <a:lumMod val="40000"/>
+                <a:lumOff val="60000"/>
+              </a:schemeClr>
+            </a:solidFill>
+          </a:ln>
+        </p:spPr>
+        <p:style>
+          <a:lnRef idx="3">
+            <a:schemeClr val="dk1"/>
+          </a:lnRef>
+          <a:fillRef idx="0">
+            <a:schemeClr val="dk1"/>
+          </a:fillRef>
+          <a:effectRef idx="2">
+            <a:schemeClr val="dk1"/>
+          </a:effectRef>
+          <a:fontRef idx="minor">
+            <a:schemeClr val="tx1"/>
+          </a:fontRef>
+        </p:style>
+      </p:cxnSp>
+      <p:sp>
+        <p:nvSpPr>
+          <p:cNvPr id="39" name="文本框 38">
+            <a:extLst>
+              <a:ext uri="{FF2B5EF4-FFF2-40B4-BE49-F238E27FC236}">
+                <a16:creationId xmlns:a16="http://schemas.microsoft.com/office/drawing/2014/main" id="{021BDD03-11F5-49B6-9795-FF34C66153F1}"/>
+              </a:ext>
+            </a:extLst>
+          </p:cNvPr>
+          <p:cNvSpPr txBox="1"/>
+          <p:nvPr/>
+        </p:nvSpPr>
+        <p:spPr>
+          <a:xfrm>
+            <a:off x="2430344" y="6313053"/>
+            <a:ext cx="7686606" cy="369332"/>
+          </a:xfrm>
+          <a:prstGeom prst="rect">
+            <a:avLst/>
+          </a:prstGeom>
+          <a:noFill/>
+        </p:spPr>
+        <p:txBody>
+          <a:bodyPr wrap="square" rtlCol="0">
+            <a:spAutoFit/>
+          </a:bodyPr>
+          <a:lstStyle/>
+          <a:p>
+            <a:r>
+              <a:rPr lang="en-AU" altLang="zh-CN" b="1" dirty="0"/>
+              <a:t>Fig2. The process to add another hidden neuron</a:t>
+            </a:r>
+            <a:endParaRPr lang="zh-CN" altLang="en-US" b="1" dirty="0"/>
+          </a:p>
+        </p:txBody>
+      </p:sp>
+    </p:spTree>
+    <p:extLst>
+      <p:ext uri="{BB962C8B-B14F-4D97-AF65-F5344CB8AC3E}">
+        <p14:creationId xmlns:p14="http://schemas.microsoft.com/office/powerpoint/2010/main" val="1685151744"/>
       </p:ext>
     </p:extLst>
   </p:cSld>
@@ -3901,7 +6668,29 @@
       </a:bgFillStyleLst>
     </a:fmtScheme>
   </a:themeElements>
-  <a:objectDefaults/>
+  <a:objectDefaults>
+    <a:lnDef>
+      <a:spPr>
+        <a:ln w="57150"/>
+      </a:spPr>
+      <a:bodyPr/>
+      <a:lstStyle/>
+      <a:style>
+        <a:lnRef idx="3">
+          <a:schemeClr val="dk1"/>
+        </a:lnRef>
+        <a:fillRef idx="0">
+          <a:schemeClr val="dk1"/>
+        </a:fillRef>
+        <a:effectRef idx="2">
+          <a:schemeClr val="dk1"/>
+        </a:effectRef>
+        <a:fontRef idx="minor">
+          <a:schemeClr val="tx1"/>
+        </a:fontRef>
+      </a:style>
+    </a:lnDef>
+  </a:objectDefaults>
   <a:extraClrSchemeLst/>
   <a:extLst>
     <a:ext uri="{05A4C25C-085E-4340-85A3-A5531E510DB2}">

</xml_diff>